<commit_message>
removed old version of eng guide presentation
</commit_message>
<xml_diff>
--- a/Guides/Become infineon portfilio expert in 1 min.pptx
+++ b/Guides/Become infineon portfilio expert in 1 min.pptx
@@ -5,26 +5,28 @@
     <p:sldMasterId id="2147483715" r:id="rId5"/>
   </p:sldMasterIdLst>
   <p:notesMasterIdLst>
-    <p:notesMasterId r:id="rId15"/>
+    <p:notesMasterId r:id="rId17"/>
   </p:notesMasterIdLst>
   <p:handoutMasterIdLst>
-    <p:handoutMasterId r:id="rId16"/>
+    <p:handoutMasterId r:id="rId18"/>
   </p:handoutMasterIdLst>
   <p:sldIdLst>
     <p:sldId id="318" r:id="rId6"/>
     <p:sldId id="325" r:id="rId7"/>
-    <p:sldId id="323" r:id="rId8"/>
-    <p:sldId id="326" r:id="rId9"/>
-    <p:sldId id="327" r:id="rId10"/>
-    <p:sldId id="328" r:id="rId11"/>
-    <p:sldId id="329" r:id="rId12"/>
-    <p:sldId id="331" r:id="rId13"/>
-    <p:sldId id="324" r:id="rId14"/>
+    <p:sldId id="334" r:id="rId8"/>
+    <p:sldId id="332" r:id="rId9"/>
+    <p:sldId id="326" r:id="rId10"/>
+    <p:sldId id="327" r:id="rId11"/>
+    <p:sldId id="328" r:id="rId12"/>
+    <p:sldId id="335" r:id="rId13"/>
+    <p:sldId id="329" r:id="rId14"/>
+    <p:sldId id="331" r:id="rId15"/>
+    <p:sldId id="324" r:id="rId16"/>
   </p:sldIdLst>
   <p:sldSz cx="9144000" cy="6858000" type="screen4x3"/>
   <p:notesSz cx="7099300" cy="10234613"/>
   <p:custDataLst>
-    <p:tags r:id="rId17"/>
+    <p:tags r:id="rId19"/>
   </p:custDataLst>
   <p:defaultTextStyle>
     <a:defPPr>
@@ -1310,194 +1312,7 @@
                 <a:cs typeface="Arial" panose="020B0604020202020204" pitchFamily="34" charset="0"/>
               </a:rPr>
               <a:pPr/>
-              <a:t>3</a:t>
-            </a:fld>
-            <a:endParaRPr lang="en-US" dirty="0" smtClean="0">
-              <a:latin typeface="Arial" panose="020B0604020202020204" pitchFamily="34" charset="0"/>
-              <a:cs typeface="Arial" panose="020B0604020202020204" pitchFamily="34" charset="0"/>
-            </a:endParaRPr>
-          </a:p>
-          <a:p>
-            <a:endParaRPr lang="en-US" dirty="0">
-              <a:latin typeface="Arial" panose="020B0604020202020204" pitchFamily="34" charset="0"/>
-              <a:cs typeface="Arial" panose="020B0604020202020204" pitchFamily="34" charset="0"/>
-            </a:endParaRPr>
-          </a:p>
-        </p:txBody>
-      </p:sp>
-    </p:spTree>
-    <p:extLst>
-      <p:ext uri="{BB962C8B-B14F-4D97-AF65-F5344CB8AC3E}">
-        <p14:creationId xmlns:p14="http://schemas.microsoft.com/office/powerpoint/2010/main" val="3328064039"/>
-      </p:ext>
-    </p:extLst>
-  </p:cSld>
-  <p:clrMapOvr>
-    <a:masterClrMapping/>
-  </p:clrMapOvr>
-</p:notes>
-</file>
-
-<file path=ppt/notesSlides/notesSlide3.xml><?xml version="1.0" encoding="utf-8"?>
-<p:notes xmlns:a="http://schemas.openxmlformats.org/drawingml/2006/main" xmlns:r="http://schemas.openxmlformats.org/officeDocument/2006/relationships" xmlns:p="http://schemas.openxmlformats.org/presentationml/2006/main">
-  <p:cSld>
-    <p:spTree>
-      <p:nvGrpSpPr>
-        <p:cNvPr id="1" name=""/>
-        <p:cNvGrpSpPr/>
-        <p:nvPr/>
-      </p:nvGrpSpPr>
-      <p:grpSpPr>
-        <a:xfrm>
-          <a:off x="0" y="0"/>
-          <a:ext cx="0" cy="0"/>
-          <a:chOff x="0" y="0"/>
-          <a:chExt cx="0" cy="0"/>
-        </a:xfrm>
-      </p:grpSpPr>
-      <p:sp>
-        <p:nvSpPr>
-          <p:cNvPr id="2" name="IFXSHAPE"/>
-          <p:cNvSpPr>
-            <a:spLocks noGrp="1" noRot="1" noChangeAspect="1"/>
-          </p:cNvSpPr>
-          <p:nvPr>
-            <p:ph type="sldImg"/>
-          </p:nvPr>
-        </p:nvSpPr>
-        <p:spPr>
-          <a:xfrm>
-            <a:off x="454025" y="1012825"/>
-            <a:ext cx="6191250" cy="4643438"/>
-          </a:xfrm>
-        </p:spPr>
-      </p:sp>
-      <p:sp>
-        <p:nvSpPr>
-          <p:cNvPr id="3" name="IFXSHAPE"/>
-          <p:cNvSpPr>
-            <a:spLocks noGrp="1"/>
-          </p:cNvSpPr>
-          <p:nvPr>
-            <p:ph type="body" idx="1"/>
-          </p:nvPr>
-        </p:nvSpPr>
-        <p:spPr/>
-        <p:txBody>
-          <a:bodyPr/>
-          <a:lstStyle/>
-          <a:p>
-            <a:endParaRPr lang="de-DE" dirty="0"/>
-          </a:p>
-        </p:txBody>
-      </p:sp>
-      <p:sp>
-        <p:nvSpPr>
-          <p:cNvPr id="4" name="IFXSHAPE"/>
-          <p:cNvSpPr>
-            <a:spLocks noGrp="1"/>
-          </p:cNvSpPr>
-          <p:nvPr>
-            <p:ph type="hdr" sz="quarter" idx="10"/>
-          </p:nvPr>
-        </p:nvSpPr>
-        <p:spPr/>
-        <p:txBody>
-          <a:bodyPr/>
-          <a:lstStyle/>
-          <a:p>
-            <a:endParaRPr lang="en-US" dirty="0"/>
-          </a:p>
-        </p:txBody>
-      </p:sp>
-      <p:sp>
-        <p:nvSpPr>
-          <p:cNvPr id="5" name="IFXSHAPE"/>
-          <p:cNvSpPr>
-            <a:spLocks noGrp="1"/>
-          </p:cNvSpPr>
-          <p:nvPr>
-            <p:ph type="ftr" sz="quarter" idx="11"/>
-          </p:nvPr>
-        </p:nvSpPr>
-        <p:spPr/>
-        <p:txBody>
-          <a:bodyPr/>
-          <a:lstStyle/>
-          <a:p>
-            <a:r>
-              <a:rPr lang="en-US" dirty="0" smtClean="0">
-                <a:latin typeface="Arial" panose="020B0604020202020204" pitchFamily="34" charset="0"/>
-                <a:cs typeface="Arial" panose="020B0604020202020204" pitchFamily="34" charset="0"/>
-              </a:rPr>
-              <a:t>Copyright © Infineon Technologies AG 2019. All rights reserved.</a:t>
-            </a:r>
-          </a:p>
-          <a:p>
-            <a:r>
-              <a:rPr lang="en-US" b="1" dirty="0" smtClean="0">
-                <a:latin typeface="Arial" panose="020B0604020202020204" pitchFamily="34" charset="0"/>
-                <a:cs typeface="Arial" panose="020B0604020202020204" pitchFamily="34" charset="0"/>
-              </a:rPr>
-              <a:t>restricted</a:t>
-            </a:r>
-            <a:endParaRPr lang="en-US" b="1" dirty="0">
-              <a:solidFill>
-                <a:srgbClr val="E30034"/>
-              </a:solidFill>
-              <a:latin typeface="Arial" panose="020B0604020202020204" pitchFamily="34" charset="0"/>
-              <a:cs typeface="Arial" panose="020B0604020202020204" pitchFamily="34" charset="0"/>
-            </a:endParaRPr>
-          </a:p>
-        </p:txBody>
-      </p:sp>
-      <p:sp>
-        <p:nvSpPr>
-          <p:cNvPr id="6" name="IFXSHAPE"/>
-          <p:cNvSpPr>
-            <a:spLocks noGrp="1"/>
-          </p:cNvSpPr>
-          <p:nvPr>
-            <p:ph type="dt" idx="12"/>
-          </p:nvPr>
-        </p:nvSpPr>
-        <p:spPr/>
-        <p:txBody>
-          <a:bodyPr/>
-          <a:lstStyle/>
-          <a:p>
-            <a:r>
-              <a:rPr lang="en-US" dirty="0" smtClean="0"/>
-              <a:t>Jan 2019</a:t>
-            </a:r>
-          </a:p>
-          <a:p>
-            <a:endParaRPr lang="en-US" dirty="0"/>
-          </a:p>
-        </p:txBody>
-      </p:sp>
-      <p:sp>
-        <p:nvSpPr>
-          <p:cNvPr id="7" name="IFXSHAPE"/>
-          <p:cNvSpPr>
-            <a:spLocks noGrp="1"/>
-          </p:cNvSpPr>
-          <p:nvPr>
-            <p:ph type="sldNum" sz="quarter" idx="13"/>
-          </p:nvPr>
-        </p:nvSpPr>
-        <p:spPr/>
-        <p:txBody>
-          <a:bodyPr/>
-          <a:lstStyle/>
-          <a:p>
-            <a:fld id="{4165D906-55BD-49C5-997D-27A40DB53D15}" type="slidenum">
-              <a:rPr lang="en-US" smtClean="0">
-                <a:latin typeface="Arial" panose="020B0604020202020204" pitchFamily="34" charset="0"/>
-                <a:cs typeface="Arial" panose="020B0604020202020204" pitchFamily="34" charset="0"/>
-              </a:rPr>
-              <a:pPr/>
-              <a:t>9</a:t>
+              <a:t>11</a:t>
             </a:fld>
             <a:endParaRPr lang="en-US" dirty="0" smtClean="0">
               <a:latin typeface="Arial" panose="020B0604020202020204" pitchFamily="34" charset="0"/>
@@ -10749,8 +10564,12 @@
               <a:t> expert in 1 </a:t>
             </a:r>
             <a:r>
+              <a:rPr lang="de-DE" dirty="0" err="1"/>
+              <a:t>m</a:t>
+            </a:r>
+            <a:r>
               <a:rPr lang="de-DE" dirty="0" err="1" smtClean="0"/>
-              <a:t>minute</a:t>
+              <a:t>inute</a:t>
             </a:r>
             <a:endParaRPr lang="de-DE" dirty="0"/>
           </a:p>
@@ -10811,6 +10630,211 @@
     <p:extLst>
       <p:ext uri="{BB962C8B-B14F-4D97-AF65-F5344CB8AC3E}">
         <p14:creationId xmlns:p14="http://schemas.microsoft.com/office/powerpoint/2010/main" val="645950025"/>
+      </p:ext>
+    </p:extLst>
+  </p:cSld>
+  <p:clrMapOvr>
+    <a:masterClrMapping/>
+  </p:clrMapOvr>
+  <p:timing>
+    <p:tnLst>
+      <p:par>
+        <p:cTn id="1" dur="indefinite" restart="never" nodeType="tmRoot"/>
+      </p:par>
+    </p:tnLst>
+  </p:timing>
+</p:sld>
+</file>
+
+<file path=ppt/slides/slide10.xml><?xml version="1.0" encoding="utf-8"?>
+<p:sld xmlns:a="http://schemas.openxmlformats.org/drawingml/2006/main" xmlns:r="http://schemas.openxmlformats.org/officeDocument/2006/relationships" xmlns:p="http://schemas.openxmlformats.org/presentationml/2006/main">
+  <p:cSld>
+    <p:spTree>
+      <p:nvGrpSpPr>
+        <p:cNvPr id="1" name=""/>
+        <p:cNvGrpSpPr/>
+        <p:nvPr/>
+      </p:nvGrpSpPr>
+      <p:grpSpPr>
+        <a:xfrm>
+          <a:off x="0" y="0"/>
+          <a:ext cx="0" cy="0"/>
+          <a:chOff x="0" y="0"/>
+          <a:chExt cx="0" cy="0"/>
+        </a:xfrm>
+      </p:grpSpPr>
+      <p:sp>
+        <p:nvSpPr>
+          <p:cNvPr id="2" name="Footer Placeholder 1"/>
+          <p:cNvSpPr>
+            <a:spLocks noGrp="1"/>
+          </p:cNvSpPr>
+          <p:nvPr>
+            <p:ph type="ftr" sz="quarter" idx="12"/>
+          </p:nvPr>
+        </p:nvSpPr>
+        <p:spPr/>
+        <p:txBody>
+          <a:bodyPr/>
+          <a:lstStyle/>
+          <a:p>
+            <a:r>
+              <a:rPr lang="en-US" smtClean="0"/>
+              <a:t>Copyright © Infineon Technologies AG 2019. All rights reserved.</a:t>
+            </a:r>
+            <a:endParaRPr lang="en-US" dirty="0"/>
+          </a:p>
+        </p:txBody>
+      </p:sp>
+      <p:sp>
+        <p:nvSpPr>
+          <p:cNvPr id="3" name="Slide Number Placeholder 2"/>
+          <p:cNvSpPr>
+            <a:spLocks noGrp="1"/>
+          </p:cNvSpPr>
+          <p:nvPr>
+            <p:ph type="sldNum" sz="quarter" idx="10"/>
+          </p:nvPr>
+        </p:nvSpPr>
+        <p:spPr/>
+        <p:txBody>
+          <a:bodyPr/>
+          <a:lstStyle/>
+          <a:p>
+            <a:fld id="{C8AC550A-2BA7-40E5-B103-B3E190EE602F}" type="slidenum">
+              <a:rPr lang="en-US" smtClean="0"/>
+              <a:pPr/>
+              <a:t>10</a:t>
+            </a:fld>
+            <a:endParaRPr lang="en-US" dirty="0"/>
+          </a:p>
+        </p:txBody>
+      </p:sp>
+      <p:sp>
+        <p:nvSpPr>
+          <p:cNvPr id="4" name="Date Placeholder 3"/>
+          <p:cNvSpPr>
+            <a:spLocks noGrp="1"/>
+          </p:cNvSpPr>
+          <p:nvPr>
+            <p:ph type="dt" sz="half" idx="11"/>
+          </p:nvPr>
+        </p:nvSpPr>
+        <p:spPr/>
+        <p:txBody>
+          <a:bodyPr/>
+          <a:lstStyle/>
+          <a:p>
+            <a:r>
+              <a:rPr lang="en-US" smtClean="0"/>
+              <a:t>Jan 2019             </a:t>
+            </a:r>
+            <a:r>
+              <a:rPr lang="en-US" b="1" smtClean="0"/>
+              <a:t>restricted</a:t>
+            </a:r>
+            <a:endParaRPr lang="en-US" b="1" dirty="0"/>
+          </a:p>
+        </p:txBody>
+      </p:sp>
+      <p:sp>
+        <p:nvSpPr>
+          <p:cNvPr id="5" name="Rectangle 4"/>
+          <p:cNvSpPr/>
+          <p:nvPr/>
+        </p:nvSpPr>
+        <p:spPr>
+          <a:xfrm>
+            <a:off x="1295400" y="2644170"/>
+            <a:ext cx="6705600" cy="1938992"/>
+          </a:xfrm>
+          <a:prstGeom prst="rect">
+            <a:avLst/>
+          </a:prstGeom>
+        </p:spPr>
+        <p:txBody>
+          <a:bodyPr wrap="square">
+            <a:spAutoFit/>
+          </a:bodyPr>
+          <a:lstStyle/>
+          <a:p>
+            <a:pPr algn="ctr"/>
+            <a:r>
+              <a:rPr lang="en-US" dirty="0" smtClean="0">
+                <a:hlinkClick r:id="rId2"/>
+              </a:rPr>
+              <a:t>Vasily.Basov@infineon.com</a:t>
+            </a:r>
+            <a:endParaRPr lang="en-US" dirty="0" smtClean="0"/>
+          </a:p>
+          <a:p>
+            <a:pPr algn="ctr"/>
+            <a:endParaRPr lang="en-US" dirty="0"/>
+          </a:p>
+          <a:p>
+            <a:pPr algn="ctr"/>
+            <a:endParaRPr lang="en-US" dirty="0"/>
+          </a:p>
+          <a:p>
+            <a:pPr algn="ctr"/>
+            <a:r>
+              <a:rPr lang="en-US" b="1" dirty="0">
+                <a:solidFill>
+                  <a:srgbClr val="FF0000"/>
+                </a:solidFill>
+              </a:rPr>
+              <a:t>Please send me your feedback, comments, and suggestions!</a:t>
+            </a:r>
+            <a:endParaRPr lang="en-US" dirty="0">
+              <a:solidFill>
+                <a:srgbClr val="FF0000"/>
+              </a:solidFill>
+              <a:effectLst/>
+            </a:endParaRPr>
+          </a:p>
+        </p:txBody>
+      </p:sp>
+    </p:spTree>
+    <p:extLst>
+      <p:ext uri="{BB962C8B-B14F-4D97-AF65-F5344CB8AC3E}">
+        <p14:creationId xmlns:p14="http://schemas.microsoft.com/office/powerpoint/2010/main" val="2538154561"/>
+      </p:ext>
+    </p:extLst>
+  </p:cSld>
+  <p:clrMapOvr>
+    <a:masterClrMapping/>
+  </p:clrMapOvr>
+  <p:timing>
+    <p:tnLst>
+      <p:par>
+        <p:cTn id="1" dur="indefinite" restart="never" nodeType="tmRoot"/>
+      </p:par>
+    </p:tnLst>
+  </p:timing>
+</p:sld>
+</file>
+
+<file path=ppt/slides/slide11.xml><?xml version="1.0" encoding="utf-8"?>
+<p:sld xmlns:a="http://schemas.openxmlformats.org/drawingml/2006/main" xmlns:r="http://schemas.openxmlformats.org/officeDocument/2006/relationships" xmlns:p="http://schemas.openxmlformats.org/presentationml/2006/main">
+  <p:cSld>
+    <p:spTree>
+      <p:nvGrpSpPr>
+        <p:cNvPr id="1" name=""/>
+        <p:cNvGrpSpPr/>
+        <p:nvPr/>
+      </p:nvGrpSpPr>
+      <p:grpSpPr>
+        <a:xfrm>
+          <a:off x="0" y="0"/>
+          <a:ext cx="0" cy="0"/>
+          <a:chOff x="0" y="0"/>
+          <a:chExt cx="0" cy="0"/>
+        </a:xfrm>
+      </p:grpSpPr>
+    </p:spTree>
+    <p:extLst>
+      <p:ext uri="{BB962C8B-B14F-4D97-AF65-F5344CB8AC3E}">
+        <p14:creationId xmlns:p14="http://schemas.microsoft.com/office/powerpoint/2010/main" val="3310874723"/>
       </p:ext>
     </p:extLst>
   </p:cSld>
@@ -10910,23 +10934,7 @@
             </a:pPr>
             <a:r>
               <a:rPr lang="en-US" dirty="0" smtClean="0"/>
-              <a:t>Sales professionals need to offer a customer optimal solution quickly </a:t>
-            </a:r>
-            <a:r>
-              <a:rPr lang="en-US" dirty="0" smtClean="0"/>
-              <a:t>without referring to the </a:t>
-            </a:r>
-            <a:r>
-              <a:rPr lang="en-US" dirty="0" smtClean="0"/>
-              <a:t>Internet </a:t>
-            </a:r>
-            <a:r>
-              <a:rPr lang="en-US" dirty="0" smtClean="0"/>
-              <a:t>or </a:t>
-            </a:r>
-            <a:r>
-              <a:rPr lang="en-US" dirty="0" smtClean="0"/>
-              <a:t>contacting engineers </a:t>
+              <a:t>Sales professionals need to offer a customer optimal solution quickly without referring to the Internet or contacting engineers </a:t>
             </a:r>
           </a:p>
           <a:p>
@@ -10945,7 +10953,55 @@
                   <a:srgbClr val="FF0000"/>
                 </a:solidFill>
               </a:rPr>
-              <a:t>Question: How much time of study, trainings and practice is needed to become familiar with Infineon portfolio?</a:t>
+              <a:t>Question: How much time of </a:t>
+            </a:r>
+            <a:r>
+              <a:rPr lang="en-US" b="1" dirty="0" smtClean="0">
+                <a:solidFill>
+                  <a:srgbClr val="FF0000"/>
+                </a:solidFill>
+              </a:rPr>
+              <a:t>stud</a:t>
+            </a:r>
+            <a:r>
+              <a:rPr lang="en-US" b="1" dirty="0" smtClean="0">
+                <a:solidFill>
+                  <a:srgbClr val="FF0000"/>
+                </a:solidFill>
+              </a:rPr>
+              <a:t>ying</a:t>
+            </a:r>
+            <a:r>
+              <a:rPr lang="en-US" b="1" dirty="0" smtClean="0">
+                <a:solidFill>
+                  <a:srgbClr val="FF0000"/>
+                </a:solidFill>
+              </a:rPr>
+              <a:t>, </a:t>
+            </a:r>
+            <a:r>
+              <a:rPr lang="en-US" b="1" dirty="0" smtClean="0">
+                <a:solidFill>
+                  <a:srgbClr val="FF0000"/>
+                </a:solidFill>
+              </a:rPr>
+              <a:t>trainings and </a:t>
+            </a:r>
+            <a:r>
+              <a:rPr lang="en-US" b="1" dirty="0" smtClean="0">
+                <a:solidFill>
+                  <a:srgbClr val="FF0000"/>
+                </a:solidFill>
+              </a:rPr>
+              <a:t>practicing </a:t>
+            </a:r>
+            <a:r>
+              <a:rPr lang="en-US" b="1" dirty="0" smtClean="0">
+                <a:solidFill>
+                  <a:srgbClr val="FF0000"/>
+                </a:solidFill>
+              </a:rPr>
+              <a:t>is needed to become familiar with Infineon portfolio?</a:t>
             </a:r>
           </a:p>
           <a:p>
@@ -11062,12 +11118,12 @@
       </p:grpSpPr>
       <p:sp>
         <p:nvSpPr>
-          <p:cNvPr id="4" name="Titel 3"/>
-          <p:cNvSpPr>
-            <a:spLocks noGrp="1"/>
-          </p:cNvSpPr>
-          <p:nvPr>
-            <p:ph type="title"/>
+          <p:cNvPr id="2" name="Footer Placeholder 1"/>
+          <p:cNvSpPr>
+            <a:spLocks noGrp="1"/>
+          </p:cNvSpPr>
+          <p:nvPr>
+            <p:ph type="ftr" sz="quarter" idx="12"/>
           </p:nvPr>
         </p:nvSpPr>
         <p:spPr/>
@@ -11076,150 +11132,29 @@
           <a:lstStyle/>
           <a:p>
             <a:r>
-              <a:rPr lang="en-US" sz="2000" dirty="0" smtClean="0"/>
-              <a:t>What is the idea of </a:t>
-            </a:r>
-            <a:r>
-              <a:rPr lang="en-US" sz="2000" b="1" dirty="0" smtClean="0"/>
-              <a:t>Smart Product Selection Map</a:t>
-            </a:r>
-            <a:r>
-              <a:rPr lang="en-US" sz="2000" dirty="0" smtClean="0"/>
-              <a:t>?</a:t>
-            </a:r>
-            <a:endParaRPr lang="en-US" sz="2000" dirty="0"/>
-          </a:p>
-        </p:txBody>
-      </p:sp>
-      <p:sp>
-        <p:nvSpPr>
-          <p:cNvPr id="6" name="Content Placeholder 5"/>
-          <p:cNvSpPr>
-            <a:spLocks noGrp="1"/>
-          </p:cNvSpPr>
-          <p:nvPr>
-            <p:ph sz="quarter" idx="13"/>
+              <a:rPr lang="en-US" smtClean="0"/>
+              <a:t>Copyright © Infineon Technologies AG 2019. All rights reserved.</a:t>
+            </a:r>
+            <a:endParaRPr lang="en-US" dirty="0"/>
+          </a:p>
+        </p:txBody>
+      </p:sp>
+      <p:sp>
+        <p:nvSpPr>
+          <p:cNvPr id="3" name="Slide Number Placeholder 2"/>
+          <p:cNvSpPr>
+            <a:spLocks noGrp="1"/>
+          </p:cNvSpPr>
+          <p:nvPr>
+            <p:ph type="sldNum" sz="quarter" idx="10"/>
           </p:nvPr>
         </p:nvSpPr>
         <p:spPr/>
-        <p:txBody>
-          <a:bodyPr>
-            <a:normAutofit fontScale="92500" lnSpcReduction="10000"/>
-          </a:bodyPr>
-          <a:lstStyle/>
-          <a:p>
-            <a:pPr marL="457200" lvl="0" indent="-457200">
-              <a:buFont typeface="+mj-lt"/>
-              <a:buAutoNum type="arabicPeriod"/>
-            </a:pPr>
-            <a:r>
-              <a:rPr lang="en-US" dirty="0"/>
-              <a:t>Actual information from Infineon’s website is automatically collected in a local database that does not require an Internet connection during further use.</a:t>
-            </a:r>
-            <a:endParaRPr lang="ru-RU" dirty="0"/>
-          </a:p>
-          <a:p>
-            <a:pPr marL="457200" lvl="0" indent="-457200">
-              <a:buFont typeface="+mj-lt"/>
-              <a:buAutoNum type="arabicPeriod"/>
-            </a:pPr>
-            <a:r>
-              <a:rPr lang="en-US" dirty="0"/>
-              <a:t>We sorted components into large categories. Then we created </a:t>
-            </a:r>
-            <a:r>
-              <a:rPr lang="en-US" dirty="0" smtClean="0"/>
-              <a:t>separate interactive page for each category. </a:t>
-            </a:r>
-            <a:r>
-              <a:rPr lang="en-US" dirty="0"/>
-              <a:t>This page immediately gives information about </a:t>
-            </a:r>
-            <a:r>
-              <a:rPr lang="en-US" dirty="0" smtClean="0"/>
-              <a:t>technical </a:t>
-            </a:r>
-            <a:r>
-              <a:rPr lang="en-US" dirty="0"/>
-              <a:t>parameters of the available products and allows you to explore the portfolio down to a single component.</a:t>
-            </a:r>
-            <a:endParaRPr lang="ru-RU" dirty="0"/>
-          </a:p>
-          <a:p>
-            <a:pPr marL="457200" lvl="0" indent="-457200">
-              <a:buFont typeface="+mj-lt"/>
-              <a:buAutoNum type="arabicPeriod"/>
-            </a:pPr>
-            <a:r>
-              <a:rPr lang="en-US" dirty="0"/>
-              <a:t>Clicking on the table cells, you move through the component parameter tree, choosing a branch according to your technical requirements, up to a particular part number.</a:t>
-            </a:r>
-            <a:endParaRPr lang="ru-RU" dirty="0"/>
-          </a:p>
-          <a:p>
-            <a:pPr marL="457200" lvl="0" indent="-457200">
-              <a:buFont typeface="+mj-lt"/>
-              <a:buAutoNum type="arabicPeriod"/>
-            </a:pPr>
-            <a:r>
-              <a:rPr lang="en-US" dirty="0"/>
-              <a:t>You can open at the same time any number of </a:t>
-            </a:r>
-            <a:r>
-              <a:rPr lang="en-US" dirty="0" smtClean="0"/>
-              <a:t>branches and part numbers </a:t>
-            </a:r>
-            <a:r>
-              <a:rPr lang="en-US" dirty="0"/>
-              <a:t>to compare </a:t>
-            </a:r>
-            <a:r>
-              <a:rPr lang="en-US" dirty="0" smtClean="0"/>
-              <a:t>visually </a:t>
-            </a:r>
-            <a:r>
-              <a:rPr lang="en-US" dirty="0"/>
-              <a:t>various options.</a:t>
-            </a:r>
-            <a:endParaRPr lang="ru-RU" dirty="0"/>
-          </a:p>
-          <a:p>
-            <a:pPr marL="457200" lvl="0" indent="-457200">
-              <a:buFont typeface="+mj-lt"/>
-              <a:buAutoNum type="arabicPeriod"/>
-            </a:pPr>
-            <a:r>
-              <a:rPr lang="en-US" dirty="0"/>
-              <a:t>Using the buttons on the control panel, you can instantly switch views of the table, viewing the portfolio in terms of various parameters. This gives a better understanding of the internal structure of the product portfolio, shows the areas of application of various technologies.</a:t>
-            </a:r>
-            <a:endParaRPr lang="ru-RU" dirty="0"/>
-          </a:p>
-          <a:p>
-            <a:endParaRPr lang="en-US" dirty="0"/>
-          </a:p>
-        </p:txBody>
-      </p:sp>
-      <p:sp>
-        <p:nvSpPr>
-          <p:cNvPr id="2" name="Slide Number Placeholder 1"/>
-          <p:cNvSpPr>
-            <a:spLocks noGrp="1"/>
-          </p:cNvSpPr>
-          <p:nvPr>
-            <p:ph type="sldNum" sz="quarter" idx="4294967295"/>
-          </p:nvPr>
-        </p:nvSpPr>
-        <p:spPr>
-          <a:xfrm>
-            <a:off x="8855075" y="6553200"/>
-            <a:ext cx="288925" cy="304800"/>
-          </a:xfrm>
-        </p:spPr>
         <p:txBody>
           <a:bodyPr/>
           <a:lstStyle/>
           <a:p>
-            <a:fld id="{8A0B42F1-57B5-42CD-953E-ED4DCE791CC1}" type="slidenum">
+            <a:fld id="{C8AC550A-2BA7-40E5-B103-B3E190EE602F}" type="slidenum">
               <a:rPr lang="en-US" smtClean="0"/>
               <a:pPr/>
               <a:t>3</a:t>
@@ -11230,30 +11165,25 @@
       </p:sp>
       <p:sp>
         <p:nvSpPr>
-          <p:cNvPr id="3" name="Date Placeholder 2"/>
-          <p:cNvSpPr>
-            <a:spLocks noGrp="1"/>
-          </p:cNvSpPr>
-          <p:nvPr>
-            <p:ph type="dt" sz="half" idx="4294967295"/>
-          </p:nvPr>
-        </p:nvSpPr>
-        <p:spPr>
-          <a:xfrm>
-            <a:off x="0" y="6553200"/>
-            <a:ext cx="287338" cy="304800"/>
-          </a:xfrm>
-        </p:spPr>
+          <p:cNvPr id="4" name="Date Placeholder 3"/>
+          <p:cNvSpPr>
+            <a:spLocks noGrp="1"/>
+          </p:cNvSpPr>
+          <p:nvPr>
+            <p:ph type="dt" sz="half" idx="11"/>
+          </p:nvPr>
+        </p:nvSpPr>
+        <p:spPr/>
         <p:txBody>
           <a:bodyPr/>
           <a:lstStyle/>
           <a:p>
             <a:r>
-              <a:rPr lang="en-US" dirty="0" smtClean="0"/>
+              <a:rPr lang="en-US" smtClean="0"/>
               <a:t>Jan 2019             </a:t>
             </a:r>
             <a:r>
-              <a:rPr lang="en-US" b="1" dirty="0" smtClean="0"/>
+              <a:rPr lang="en-US" b="1" smtClean="0"/>
               <a:t>restricted</a:t>
             </a:r>
             <a:endParaRPr lang="en-US" b="1" dirty="0"/>
@@ -11262,49 +11192,113 @@
       </p:sp>
       <p:sp>
         <p:nvSpPr>
-          <p:cNvPr id="5" name="Footer Placeholder 4"/>
-          <p:cNvSpPr>
-            <a:spLocks noGrp="1"/>
-          </p:cNvSpPr>
-          <p:nvPr>
-            <p:ph type="ftr" sz="quarter" idx="4294967295"/>
-          </p:nvPr>
-        </p:nvSpPr>
-        <p:spPr>
-          <a:xfrm>
-            <a:off x="0" y="6553200"/>
-            <a:ext cx="574675" cy="304800"/>
-          </a:xfrm>
-        </p:spPr>
-        <p:txBody>
-          <a:bodyPr/>
+          <p:cNvPr id="5" name="TextBox 4"/>
+          <p:cNvSpPr txBox="1"/>
+          <p:nvPr/>
+        </p:nvSpPr>
+        <p:spPr bwMode="auto">
+          <a:xfrm>
+            <a:off x="2209171" y="1905000"/>
+            <a:ext cx="4725653" cy="677108"/>
+          </a:xfrm>
+          <a:prstGeom prst="rect">
+            <a:avLst/>
+          </a:prstGeom>
+          <a:noFill/>
+          <a:ln w="9525">
+            <a:noFill/>
+            <a:miter lim="800000"/>
+            <a:headEnd/>
+            <a:tailEnd/>
+          </a:ln>
+          <a:effectLst/>
+        </p:spPr>
+        <p:txBody>
+          <a:bodyPr wrap="none" lIns="0" tIns="0" rIns="0" bIns="0" rtlCol="0" anchor="ctr" anchorCtr="0">
+            <a:spAutoFit/>
+          </a:bodyPr>
           <a:lstStyle/>
           <a:p>
-            <a:r>
-              <a:rPr lang="en-US" dirty="0" smtClean="0"/>
-              <a:t>Copyright © Infineon Technologies AG 2019. All rights reserved.</a:t>
-            </a:r>
-            <a:endParaRPr lang="en-US" dirty="0"/>
-          </a:p>
-        </p:txBody>
-      </p:sp>
+            <a:pPr marR="0" defTabSz="914400" eaLnBrk="0" fontAlgn="auto" latinLnBrk="0" hangingPunct="0">
+              <a:spcBef>
+                <a:spcPts val="0"/>
+              </a:spcBef>
+              <a:spcAft>
+                <a:spcPts val="300"/>
+              </a:spcAft>
+              <a:buClr>
+                <a:schemeClr val="accent1"/>
+              </a:buClr>
+              <a:buSzTx/>
+              <a:tabLst/>
+            </a:pPr>
+            <a:r>
+              <a:rPr lang="en-US" sz="4400" kern="0" dirty="0">
+                <a:latin typeface="Verdana" pitchFamily="34" charset="0"/>
+                <a:ea typeface="Verdana" pitchFamily="34" charset="0"/>
+                <a:cs typeface="Verdana" pitchFamily="34" charset="0"/>
+              </a:rPr>
+              <a:t>What's the idea?</a:t>
+            </a:r>
+            <a:endParaRPr lang="en-US" sz="4400" kern="0" dirty="0" smtClean="0">
+              <a:latin typeface="Verdana" pitchFamily="34" charset="0"/>
+              <a:ea typeface="Verdana" pitchFamily="34" charset="0"/>
+              <a:cs typeface="Verdana" pitchFamily="34" charset="0"/>
+            </a:endParaRPr>
+          </a:p>
+        </p:txBody>
+      </p:sp>
+      <p:pic>
+        <p:nvPicPr>
+          <p:cNvPr id="2052" name="Picture 4" descr="http://chittagongit.com/images/idea-icon-png/idea-icon-png-0.jpg"/>
+          <p:cNvPicPr>
+            <a:picLocks noChangeAspect="1" noChangeArrowheads="1"/>
+          </p:cNvPicPr>
+          <p:nvPr/>
+        </p:nvPicPr>
+        <p:blipFill>
+          <a:blip r:embed="rId2" cstate="print">
+            <a:extLst>
+              <a:ext uri="{28A0092B-C50C-407E-A947-70E740481C1C}">
+                <a14:useLocalDpi xmlns:a14="http://schemas.microsoft.com/office/drawing/2010/main" val="0"/>
+              </a:ext>
+            </a:extLst>
+          </a:blip>
+          <a:srcRect/>
+          <a:stretch>
+            <a:fillRect/>
+          </a:stretch>
+        </p:blipFill>
+        <p:spPr bwMode="auto">
+          <a:xfrm>
+            <a:off x="3237642" y="3124200"/>
+            <a:ext cx="2668710" cy="2668710"/>
+          </a:xfrm>
+          <a:prstGeom prst="rect">
+            <a:avLst/>
+          </a:prstGeom>
+          <a:noFill/>
+          <a:extLst>
+            <a:ext uri="{909E8E84-426E-40DD-AFC4-6F175D3DCCD1}">
+              <a14:hiddenFill xmlns:a14="http://schemas.microsoft.com/office/drawing/2010/main">
+                <a:solidFill>
+                  <a:srgbClr val="FFFFFF"/>
+                </a:solidFill>
+              </a14:hiddenFill>
+            </a:ext>
+          </a:extLst>
+        </p:spPr>
+      </p:pic>
     </p:spTree>
     <p:extLst>
       <p:ext uri="{BB962C8B-B14F-4D97-AF65-F5344CB8AC3E}">
-        <p14:creationId xmlns:p14="http://schemas.microsoft.com/office/powerpoint/2010/main" val="1359260086"/>
+        <p14:creationId xmlns:p14="http://schemas.microsoft.com/office/powerpoint/2010/main" val="1503745028"/>
       </p:ext>
     </p:extLst>
   </p:cSld>
   <p:clrMapOvr>
     <a:masterClrMapping/>
   </p:clrMapOvr>
-  <p:timing>
-    <p:tnLst>
-      <p:par>
-        <p:cTn id="1" dur="indefinite" restart="never" nodeType="tmRoot"/>
-      </p:par>
-    </p:tnLst>
-  </p:timing>
 </p:sld>
 </file>
 
@@ -11372,15 +11366,40 @@
           </a:p>
         </p:txBody>
       </p:sp>
+      <p:sp>
+        <p:nvSpPr>
+          <p:cNvPr id="6" name="Date Placeholder 5"/>
+          <p:cNvSpPr>
+            <a:spLocks noGrp="1"/>
+          </p:cNvSpPr>
+          <p:nvPr>
+            <p:ph type="dt" sz="half" idx="15"/>
+          </p:nvPr>
+        </p:nvSpPr>
+        <p:spPr/>
+        <p:txBody>
+          <a:bodyPr/>
+          <a:lstStyle/>
+          <a:p>
+            <a:r>
+              <a:rPr lang="en-US" smtClean="0"/>
+              <a:t>Jan 2019             </a:t>
+            </a:r>
+            <a:r>
+              <a:rPr lang="en-US" b="1" smtClean="0"/>
+              <a:t>restricted</a:t>
+            </a:r>
+            <a:endParaRPr lang="en-US" b="1" dirty="0"/>
+          </a:p>
+        </p:txBody>
+      </p:sp>
       <p:pic>
         <p:nvPicPr>
-          <p:cNvPr id="7" name="Content Placeholder 6"/>
+          <p:cNvPr id="1028" name="Picture 4" descr="Image result for download icon"/>
           <p:cNvPicPr>
-            <a:picLocks noGrp="1" noChangeAspect="1"/>
+            <a:picLocks noChangeAspect="1" noChangeArrowheads="1"/>
           </p:cNvPicPr>
-          <p:nvPr>
-            <p:ph sz="quarter" idx="13"/>
-          </p:nvPr>
+          <p:nvPr/>
         </p:nvPicPr>
         <p:blipFill>
           <a:blip r:embed="rId2">
@@ -11390,159 +11409,120 @@
               </a:ext>
             </a:extLst>
           </a:blip>
+          <a:srcRect/>
           <a:stretch>
             <a:fillRect/>
           </a:stretch>
         </p:blipFill>
-        <p:spPr>
-          <a:xfrm>
-            <a:off x="0" y="1303067"/>
-            <a:ext cx="9068295" cy="4419600"/>
-          </a:xfrm>
-        </p:spPr>
-      </p:pic>
-      <p:sp>
-        <p:nvSpPr>
-          <p:cNvPr id="6" name="Date Placeholder 5"/>
-          <p:cNvSpPr>
-            <a:spLocks noGrp="1"/>
-          </p:cNvSpPr>
-          <p:nvPr>
-            <p:ph type="dt" sz="half" idx="15"/>
-          </p:nvPr>
-        </p:nvSpPr>
-        <p:spPr/>
-        <p:txBody>
-          <a:bodyPr/>
-          <a:lstStyle/>
-          <a:p>
-            <a:r>
-              <a:rPr lang="en-US" smtClean="0"/>
-              <a:t>Jan 2019             </a:t>
-            </a:r>
-            <a:r>
-              <a:rPr lang="en-US" b="1" smtClean="0"/>
-              <a:t>restricted</a:t>
-            </a:r>
-            <a:endParaRPr lang="en-US" b="1" dirty="0"/>
-          </a:p>
-        </p:txBody>
-      </p:sp>
-      <p:sp>
-        <p:nvSpPr>
-          <p:cNvPr id="8" name="Rectangle 7"/>
-          <p:cNvSpPr/>
-          <p:nvPr/>
-        </p:nvSpPr>
         <p:spPr bwMode="auto">
           <a:xfrm>
-            <a:off x="0" y="1600200"/>
-            <a:ext cx="8915894" cy="304800"/>
+            <a:off x="3352800" y="2905962"/>
+            <a:ext cx="4419600" cy="3311102"/>
           </a:xfrm>
           <a:prstGeom prst="rect">
             <a:avLst/>
           </a:prstGeom>
           <a:noFill/>
-          <a:ln w="22225">
-            <a:solidFill>
-              <a:schemeClr val="accent1"/>
-            </a:solidFill>
-            <a:miter lim="800000"/>
-            <a:headEnd/>
-            <a:tailEnd/>
-          </a:ln>
-        </p:spPr>
-        <p:txBody>
-          <a:bodyPr wrap="square" lIns="72000" tIns="72000" rIns="72000" bIns="72000" rtlCol="0" anchor="ctr"/>
-          <a:lstStyle/>
-          <a:p>
-            <a:pPr algn="ctr" eaLnBrk="0" hangingPunct="0"/>
-            <a:endParaRPr lang="en-US" sz="1600" dirty="0" smtClean="0">
-              <a:latin typeface="+mn-lt"/>
-              <a:ea typeface="Verdana" pitchFamily="34" charset="0"/>
-              <a:cs typeface="Verdana" pitchFamily="34" charset="0"/>
-            </a:endParaRPr>
-          </a:p>
-        </p:txBody>
-      </p:sp>
-      <p:sp>
-        <p:nvSpPr>
-          <p:cNvPr id="12" name="TextBox 11"/>
-          <p:cNvSpPr txBox="1"/>
+          <a:extLst>
+            <a:ext uri="{909E8E84-426E-40DD-AFC4-6F175D3DCCD1}">
+              <a14:hiddenFill xmlns:a14="http://schemas.microsoft.com/office/drawing/2010/main">
+                <a:solidFill>
+                  <a:srgbClr val="FFFFFF"/>
+                </a:solidFill>
+              </a14:hiddenFill>
+            </a:ext>
+          </a:extLst>
+        </p:spPr>
+      </p:pic>
+      <p:pic>
+        <p:nvPicPr>
+          <p:cNvPr id="1030" name="Picture 6" descr="Image result for regular icon"/>
+          <p:cNvPicPr>
+            <a:picLocks noChangeAspect="1" noChangeArrowheads="1"/>
+          </p:cNvPicPr>
           <p:nvPr/>
-        </p:nvSpPr>
+        </p:nvPicPr>
+        <p:blipFill>
+          <a:blip r:embed="rId3" cstate="print">
+            <a:extLst>
+              <a:ext uri="{28A0092B-C50C-407E-A947-70E740481C1C}">
+                <a14:useLocalDpi xmlns:a14="http://schemas.microsoft.com/office/drawing/2010/main" val="0"/>
+              </a:ext>
+            </a:extLst>
+          </a:blip>
+          <a:srcRect/>
+          <a:stretch>
+            <a:fillRect/>
+          </a:stretch>
+        </p:blipFill>
         <p:spPr bwMode="auto">
           <a:xfrm>
-            <a:off x="2991199" y="1087623"/>
-            <a:ext cx="2236190" cy="215444"/>
+            <a:off x="2054469" y="3886200"/>
+            <a:ext cx="1371600" cy="1350627"/>
           </a:xfrm>
           <a:prstGeom prst="rect">
             <a:avLst/>
           </a:prstGeom>
           <a:noFill/>
-          <a:ln w="9525">
-            <a:noFill/>
-            <a:miter lim="800000"/>
-            <a:headEnd/>
-            <a:tailEnd/>
-          </a:ln>
-          <a:effectLst/>
-        </p:spPr>
-        <p:txBody>
-          <a:bodyPr wrap="none" lIns="0" tIns="0" rIns="0" bIns="0" rtlCol="0" anchor="ctr" anchorCtr="0">
+          <a:extLst>
+            <a:ext uri="{909E8E84-426E-40DD-AFC4-6F175D3DCCD1}">
+              <a14:hiddenFill xmlns:a14="http://schemas.microsoft.com/office/drawing/2010/main">
+                <a:solidFill>
+                  <a:srgbClr val="FFFFFF"/>
+                </a:solidFill>
+              </a14:hiddenFill>
+            </a:ext>
+          </a:extLst>
+        </p:spPr>
+      </p:pic>
+      <p:sp>
+        <p:nvSpPr>
+          <p:cNvPr id="8" name="Rectangle 7"/>
+          <p:cNvSpPr/>
+          <p:nvPr/>
+        </p:nvSpPr>
+        <p:spPr>
+          <a:xfrm>
+            <a:off x="314516" y="1638198"/>
+            <a:ext cx="8001000" cy="1200329"/>
+          </a:xfrm>
+          <a:prstGeom prst="rect">
+            <a:avLst/>
+          </a:prstGeom>
+        </p:spPr>
+        <p:txBody>
+          <a:bodyPr wrap="square">
             <a:spAutoFit/>
           </a:bodyPr>
           <a:lstStyle/>
           <a:p>
-            <a:pPr marR="0" defTabSz="914400" eaLnBrk="0" fontAlgn="auto" latinLnBrk="0" hangingPunct="0">
-              <a:spcBef>
-                <a:spcPts val="0"/>
-              </a:spcBef>
-              <a:spcAft>
-                <a:spcPts val="300"/>
-              </a:spcAft>
-              <a:buClr>
-                <a:schemeClr val="accent1"/>
-              </a:buClr>
-              <a:buSzTx/>
-              <a:tabLst/>
-            </a:pPr>
-            <a:r>
-              <a:rPr lang="en-US" sz="1400" b="1" dirty="0" smtClean="0">
+            <a:pPr lvl="0"/>
+            <a:r>
+              <a:rPr lang="en-US" dirty="0">
                 <a:solidFill>
                   <a:srgbClr val="FF0000"/>
                 </a:solidFill>
               </a:rPr>
-              <a:t>1. Select product category</a:t>
-            </a:r>
-            <a:endParaRPr lang="en-US" sz="1400" b="1" kern="0" dirty="0" smtClean="0">
-              <a:solidFill>
-                <a:srgbClr val="FF0000"/>
-              </a:solidFill>
-              <a:latin typeface="Verdana" pitchFamily="34" charset="0"/>
-              <a:ea typeface="Verdana" pitchFamily="34" charset="0"/>
-              <a:cs typeface="Verdana" pitchFamily="34" charset="0"/>
-            </a:endParaRPr>
+              <a:t>Actual information from Infineon’s website is automatically collected in a local database that does not require an Internet connection during further use</a:t>
+            </a:r>
+            <a:r>
+              <a:rPr lang="en-US" dirty="0"/>
+              <a:t>.</a:t>
+            </a:r>
+            <a:endParaRPr lang="ru-RU" dirty="0"/>
           </a:p>
         </p:txBody>
       </p:sp>
     </p:spTree>
     <p:extLst>
       <p:ext uri="{BB962C8B-B14F-4D97-AF65-F5344CB8AC3E}">
-        <p14:creationId xmlns:p14="http://schemas.microsoft.com/office/powerpoint/2010/main" val="676193474"/>
+        <p14:creationId xmlns:p14="http://schemas.microsoft.com/office/powerpoint/2010/main" val="3969872449"/>
       </p:ext>
     </p:extLst>
   </p:cSld>
   <p:clrMapOvr>
     <a:masterClrMapping/>
   </p:clrMapOvr>
-  <p:timing>
-    <p:tnLst>
-      <p:par>
-        <p:cTn id="1" dur="indefinite" restart="never" nodeType="tmRoot"/>
-      </p:par>
-    </p:tnLst>
-  </p:timing>
 </p:sld>
 </file>
 
@@ -11578,56 +11558,11 @@
           <a:bodyPr/>
           <a:lstStyle/>
           <a:p>
-            <a:pPr marL="0" marR="0" lvl="0" indent="0" algn="ctr" defTabSz="914400" rtl="0" eaLnBrk="1" fontAlgn="t" latinLnBrk="0" hangingPunct="1">
-              <a:lnSpc>
-                <a:spcPct val="100000"/>
-              </a:lnSpc>
-              <a:spcBef>
-                <a:spcPct val="0"/>
-              </a:spcBef>
-              <a:spcAft>
-                <a:spcPct val="0"/>
-              </a:spcAft>
-              <a:buClr>
-                <a:srgbClr val="928285"/>
-              </a:buClr>
-              <a:buSzTx/>
-              <a:buFontTx/>
-              <a:buNone/>
-              <a:tabLst/>
-              <a:defRPr/>
-            </a:pPr>
-            <a:r>
-              <a:rPr kumimoji="0" lang="en-US" sz="800" b="0" i="0" u="none" strike="noStrike" kern="1200" cap="none" spc="0" normalizeH="0" baseline="0" noProof="0" smtClean="0">
-                <a:ln>
-                  <a:noFill/>
-                </a:ln>
-                <a:solidFill>
-                  <a:srgbClr val="928285"/>
-                </a:solidFill>
-                <a:effectLst/>
-                <a:uLnTx/>
-                <a:uFillTx/>
-                <a:latin typeface="Arial" panose="020B0604020202020204" pitchFamily="34" charset="0"/>
-                <a:ea typeface="+mn-ea"/>
-                <a:cs typeface="Verdana"/>
-              </a:rPr>
+            <a:r>
+              <a:rPr lang="en-US" smtClean="0"/>
               <a:t>Copyright © Infineon Technologies AG 2019. All rights reserved.</a:t>
             </a:r>
-            <a:endParaRPr kumimoji="0" lang="en-US" sz="800" b="0" i="0" u="none" strike="noStrike" kern="1200" cap="none" spc="0" normalizeH="0" baseline="0" noProof="0" dirty="0">
-              <a:ln>
-                <a:noFill/>
-              </a:ln>
-              <a:solidFill>
-                <a:srgbClr val="928285"/>
-              </a:solidFill>
-              <a:effectLst/>
-              <a:uLnTx/>
-              <a:uFillTx/>
-              <a:latin typeface="Arial" panose="020B0604020202020204" pitchFamily="34" charset="0"/>
-              <a:ea typeface="+mn-ea"/>
-              <a:cs typeface="Verdana"/>
-            </a:endParaRPr>
+            <a:endParaRPr lang="en-US" dirty="0"/>
           </a:p>
         </p:txBody>
       </p:sp>
@@ -11646,75 +11581,12 @@
           <a:bodyPr/>
           <a:lstStyle/>
           <a:p>
-            <a:pPr marL="0" marR="0" lvl="0" indent="0" algn="r" defTabSz="914400" rtl="0" eaLnBrk="1" fontAlgn="t" latinLnBrk="0" hangingPunct="1">
-              <a:lnSpc>
-                <a:spcPct val="100000"/>
-              </a:lnSpc>
-              <a:spcBef>
-                <a:spcPct val="0"/>
-              </a:spcBef>
-              <a:spcAft>
-                <a:spcPct val="0"/>
-              </a:spcAft>
-              <a:buClr>
-                <a:srgbClr val="928285"/>
-              </a:buClr>
-              <a:buSzTx/>
-              <a:buFontTx/>
-              <a:buNone/>
-              <a:tabLst/>
-              <a:defRPr/>
-            </a:pPr>
             <a:fld id="{132FE172-F370-450B-9494-FD7900E1DA7D}" type="slidenum">
-              <a:rPr kumimoji="0" lang="en-US" sz="1200" b="0" i="0" u="none" strike="noStrike" kern="1200" cap="none" spc="0" normalizeH="0" baseline="0" noProof="0" smtClean="0">
-                <a:ln>
-                  <a:noFill/>
-                </a:ln>
-                <a:solidFill>
-                  <a:srgbClr val="FFFFFF"/>
-                </a:solidFill>
-                <a:effectLst/>
-                <a:uLnTx/>
-                <a:uFillTx/>
-                <a:latin typeface="Arial" panose="020B0604020202020204" pitchFamily="34" charset="0"/>
-                <a:ea typeface="+mn-ea"/>
-                <a:cs typeface="Verdana"/>
-              </a:rPr>
-              <a:pPr marL="0" marR="0" lvl="0" indent="0" algn="r" defTabSz="914400" rtl="0" eaLnBrk="1" fontAlgn="t" latinLnBrk="0" hangingPunct="1">
-                <a:lnSpc>
-                  <a:spcPct val="100000"/>
-                </a:lnSpc>
-                <a:spcBef>
-                  <a:spcPct val="0"/>
-                </a:spcBef>
-                <a:spcAft>
-                  <a:spcPct val="0"/>
-                </a:spcAft>
-                <a:buClr>
-                  <a:srgbClr val="928285"/>
-                </a:buClr>
-                <a:buSzTx/>
-                <a:buFontTx/>
-                <a:buNone/>
-                <a:tabLst/>
-                <a:defRPr/>
-              </a:pPr>
+              <a:rPr lang="en-US" smtClean="0"/>
+              <a:pPr/>
               <a:t>5</a:t>
             </a:fld>
-            <a:endParaRPr kumimoji="0" lang="en-US" sz="1200" b="0" i="0" u="none" strike="noStrike" kern="1200" cap="none" spc="0" normalizeH="0" baseline="0" noProof="0" dirty="0">
-              <a:ln>
-                <a:noFill/>
-              </a:ln>
-              <a:solidFill>
-                <a:srgbClr val="FFFFFF"/>
-              </a:solidFill>
-              <a:effectLst/>
-              <a:uLnTx/>
-              <a:uFillTx/>
-              <a:latin typeface="Arial" panose="020B0604020202020204" pitchFamily="34" charset="0"/>
-              <a:ea typeface="+mn-ea"/>
-              <a:cs typeface="Verdana"/>
-            </a:endParaRPr>
+            <a:endParaRPr lang="en-US" dirty="0"/>
           </a:p>
         </p:txBody>
       </p:sp>
@@ -11742,8 +11614,8 @@
         </p:blipFill>
         <p:spPr>
           <a:xfrm>
-            <a:off x="-1" y="1143000"/>
-            <a:ext cx="9144001" cy="4343400"/>
+            <a:off x="122845" y="1794316"/>
+            <a:ext cx="9068295" cy="4419600"/>
           </a:xfrm>
         </p:spPr>
       </p:pic>
@@ -11762,123 +11634,176 @@
           <a:bodyPr/>
           <a:lstStyle/>
           <a:p>
-            <a:pPr marL="0" marR="0" lvl="0" indent="0" algn="l" defTabSz="914400" rtl="0" eaLnBrk="1" fontAlgn="t" latinLnBrk="0" hangingPunct="1">
-              <a:lnSpc>
-                <a:spcPct val="100000"/>
-              </a:lnSpc>
-              <a:spcBef>
-                <a:spcPct val="0"/>
-              </a:spcBef>
-              <a:spcAft>
-                <a:spcPct val="0"/>
-              </a:spcAft>
-              <a:buClr>
-                <a:srgbClr val="928285"/>
-              </a:buClr>
-              <a:buSzTx/>
-              <a:buFontTx/>
-              <a:buNone/>
-              <a:tabLst/>
-              <a:defRPr/>
-            </a:pPr>
-            <a:r>
-              <a:rPr kumimoji="0" lang="en-US" sz="800" b="0" i="0" u="none" strike="noStrike" kern="1200" cap="none" spc="0" normalizeH="0" baseline="0" noProof="0" smtClean="0">
-                <a:ln>
-                  <a:noFill/>
-                </a:ln>
-                <a:solidFill>
-                  <a:srgbClr val="928285"/>
-                </a:solidFill>
-                <a:effectLst/>
-                <a:uLnTx/>
-                <a:uFillTx/>
-                <a:latin typeface="Arial" panose="020B0604020202020204" pitchFamily="34" charset="0"/>
-                <a:ea typeface="+mn-ea"/>
-                <a:cs typeface="Verdana"/>
-              </a:rPr>
+            <a:r>
+              <a:rPr lang="en-US" smtClean="0"/>
               <a:t>Jan 2019             </a:t>
             </a:r>
             <a:r>
-              <a:rPr kumimoji="0" lang="en-US" sz="800" b="1" i="0" u="none" strike="noStrike" kern="1200" cap="none" spc="0" normalizeH="0" baseline="0" noProof="0" smtClean="0">
-                <a:ln>
-                  <a:noFill/>
-                </a:ln>
-                <a:solidFill>
-                  <a:srgbClr val="928285"/>
-                </a:solidFill>
-                <a:effectLst/>
-                <a:uLnTx/>
-                <a:uFillTx/>
-                <a:latin typeface="Arial" panose="020B0604020202020204" pitchFamily="34" charset="0"/>
-                <a:ea typeface="+mn-ea"/>
-                <a:cs typeface="Verdana"/>
-              </a:rPr>
+              <a:rPr lang="en-US" b="1" smtClean="0"/>
               <a:t>restricted</a:t>
             </a:r>
-            <a:endParaRPr kumimoji="0" lang="en-US" sz="800" b="1" i="0" u="none" strike="noStrike" kern="1200" cap="none" spc="0" normalizeH="0" baseline="0" noProof="0" dirty="0">
-              <a:ln>
-                <a:noFill/>
-              </a:ln>
-              <a:solidFill>
-                <a:srgbClr val="928285"/>
-              </a:solidFill>
-              <a:effectLst/>
-              <a:uLnTx/>
-              <a:uFillTx/>
-              <a:latin typeface="Arial" panose="020B0604020202020204" pitchFamily="34" charset="0"/>
-              <a:ea typeface="+mn-ea"/>
-              <a:cs typeface="Verdana"/>
-            </a:endParaRPr>
-          </a:p>
-        </p:txBody>
-      </p:sp>
-      <p:sp>
-        <p:nvSpPr>
-          <p:cNvPr id="8" name="Rectangle 7"/>
+            <a:endParaRPr lang="en-US" b="1" dirty="0"/>
+          </a:p>
+        </p:txBody>
+      </p:sp>
+      <p:sp>
+        <p:nvSpPr>
+          <p:cNvPr id="4" name="Rectangle 3"/>
           <p:cNvSpPr/>
           <p:nvPr/>
         </p:nvSpPr>
-        <p:spPr bwMode="auto">
-          <a:xfrm>
-            <a:off x="0" y="1752600"/>
-            <a:ext cx="2362200" cy="381000"/>
+        <p:spPr>
+          <a:xfrm>
+            <a:off x="633046" y="1036958"/>
+            <a:ext cx="8160942" cy="646331"/>
           </a:xfrm>
           <a:prstGeom prst="rect">
             <a:avLst/>
           </a:prstGeom>
-          <a:noFill/>
+        </p:spPr>
+        <p:txBody>
+          <a:bodyPr wrap="square">
+            <a:spAutoFit/>
+          </a:bodyPr>
+          <a:lstStyle/>
+          <a:p>
+            <a:pPr lvl="0"/>
+            <a:r>
+              <a:rPr lang="en-US" sz="1800" dirty="0">
+                <a:solidFill>
+                  <a:srgbClr val="FF0000"/>
+                </a:solidFill>
+              </a:rPr>
+              <a:t>We sorted components into large categories. Then we created separate interactive page for each category</a:t>
+            </a:r>
+            <a:r>
+              <a:rPr lang="en-US" sz="1800" dirty="0" smtClean="0">
+                <a:solidFill>
+                  <a:srgbClr val="FF0000"/>
+                </a:solidFill>
+              </a:rPr>
+              <a:t>.</a:t>
+            </a:r>
+            <a:endParaRPr lang="ru-RU" sz="1800" dirty="0">
+              <a:solidFill>
+                <a:srgbClr val="FF0000"/>
+              </a:solidFill>
+            </a:endParaRPr>
+          </a:p>
+        </p:txBody>
+      </p:sp>
+      <p:cxnSp>
+        <p:nvCxnSpPr>
+          <p:cNvPr id="9" name="Straight Arrow Connector 8"/>
+          <p:cNvCxnSpPr/>
+          <p:nvPr/>
+        </p:nvCxnSpPr>
+        <p:spPr>
+          <a:xfrm>
+            <a:off x="3276600" y="1683289"/>
+            <a:ext cx="1295400" cy="526511"/>
+          </a:xfrm>
+          <a:prstGeom prst="straightConnector1">
+            <a:avLst/>
+          </a:prstGeom>
           <a:ln w="22225">
-            <a:solidFill>
-              <a:schemeClr val="accent1"/>
-            </a:solidFill>
-            <a:miter lim="800000"/>
-            <a:headEnd/>
-            <a:tailEnd/>
+            <a:prstDash val="sysDot"/>
+            <a:tailEnd type="triangle"/>
           </a:ln>
         </p:spPr>
-        <p:txBody>
-          <a:bodyPr wrap="square" lIns="72000" tIns="72000" rIns="72000" bIns="72000" rtlCol="0" anchor="ctr"/>
-          <a:lstStyle/>
-          <a:p>
-            <a:pPr algn="ctr" eaLnBrk="0" hangingPunct="0"/>
-            <a:endParaRPr lang="en-US" sz="1600" dirty="0" smtClean="0">
-              <a:latin typeface="+mn-lt"/>
-              <a:ea typeface="Verdana" pitchFamily="34" charset="0"/>
-              <a:cs typeface="Verdana" pitchFamily="34" charset="0"/>
-            </a:endParaRPr>
-          </a:p>
-        </p:txBody>
-      </p:sp>
-      <p:sp>
-        <p:nvSpPr>
-          <p:cNvPr id="9" name="TextBox 8"/>
+        <p:style>
+          <a:lnRef idx="1">
+            <a:schemeClr val="accent1"/>
+          </a:lnRef>
+          <a:fillRef idx="0">
+            <a:schemeClr val="accent1"/>
+          </a:fillRef>
+          <a:effectRef idx="0">
+            <a:schemeClr val="accent1"/>
+          </a:effectRef>
+          <a:fontRef idx="minor">
+            <a:schemeClr val="tx1"/>
+          </a:fontRef>
+        </p:style>
+      </p:cxnSp>
+      <p:cxnSp>
+        <p:nvCxnSpPr>
+          <p:cNvPr id="13" name="Straight Arrow Connector 12"/>
+          <p:cNvCxnSpPr/>
+          <p:nvPr/>
+        </p:nvCxnSpPr>
+        <p:spPr>
+          <a:xfrm flipH="1">
+            <a:off x="538860" y="1683289"/>
+            <a:ext cx="2737740" cy="526511"/>
+          </a:xfrm>
+          <a:prstGeom prst="straightConnector1">
+            <a:avLst/>
+          </a:prstGeom>
+          <a:ln w="22225">
+            <a:prstDash val="sysDot"/>
+            <a:tailEnd type="triangle"/>
+          </a:ln>
+        </p:spPr>
+        <p:style>
+          <a:lnRef idx="1">
+            <a:schemeClr val="accent1"/>
+          </a:lnRef>
+          <a:fillRef idx="0">
+            <a:schemeClr val="accent1"/>
+          </a:fillRef>
+          <a:effectRef idx="0">
+            <a:schemeClr val="accent1"/>
+          </a:effectRef>
+          <a:fontRef idx="minor">
+            <a:schemeClr val="tx1"/>
+          </a:fontRef>
+        </p:style>
+      </p:cxnSp>
+      <p:cxnSp>
+        <p:nvCxnSpPr>
+          <p:cNvPr id="16" name="Straight Arrow Connector 15"/>
+          <p:cNvCxnSpPr/>
+          <p:nvPr/>
+        </p:nvCxnSpPr>
+        <p:spPr>
+          <a:xfrm>
+            <a:off x="3276600" y="1683289"/>
+            <a:ext cx="4267200" cy="526511"/>
+          </a:xfrm>
+          <a:prstGeom prst="straightConnector1">
+            <a:avLst/>
+          </a:prstGeom>
+          <a:ln w="22225">
+            <a:prstDash val="sysDot"/>
+            <a:tailEnd type="triangle"/>
+          </a:ln>
+        </p:spPr>
+        <p:style>
+          <a:lnRef idx="1">
+            <a:schemeClr val="accent1"/>
+          </a:lnRef>
+          <a:fillRef idx="0">
+            <a:schemeClr val="accent1"/>
+          </a:fillRef>
+          <a:effectRef idx="0">
+            <a:schemeClr val="accent1"/>
+          </a:effectRef>
+          <a:fontRef idx="minor">
+            <a:schemeClr val="tx1"/>
+          </a:fontRef>
+        </p:style>
+      </p:cxnSp>
+      <p:sp>
+        <p:nvSpPr>
+          <p:cNvPr id="19" name="TextBox 18"/>
           <p:cNvSpPr txBox="1"/>
           <p:nvPr/>
         </p:nvSpPr>
         <p:spPr bwMode="auto">
           <a:xfrm>
-            <a:off x="2514600" y="1752600"/>
-            <a:ext cx="2891817" cy="215444"/>
+            <a:off x="268409" y="451800"/>
+            <a:ext cx="4780155" cy="430887"/>
           </a:xfrm>
           <a:prstGeom prst="rect">
             <a:avLst/>
@@ -11912,36 +11837,23 @@
               <a:tabLst/>
             </a:pPr>
             <a:r>
-              <a:rPr lang="en-US" sz="1400" b="1" dirty="0">
+              <a:rPr lang="en-US" sz="2800" kern="0" dirty="0" smtClean="0">
                 <a:solidFill>
                   <a:srgbClr val="FF0000"/>
                 </a:solidFill>
+                <a:latin typeface="Verdana" pitchFamily="34" charset="0"/>
+                <a:ea typeface="Verdana" pitchFamily="34" charset="0"/>
+                <a:cs typeface="Verdana" pitchFamily="34" charset="0"/>
               </a:rPr>
-              <a:t>2</a:t>
-            </a:r>
-            <a:r>
-              <a:rPr lang="en-US" sz="1400" b="1" dirty="0" smtClean="0">
-                <a:solidFill>
-                  <a:srgbClr val="FF0000"/>
-                </a:solidFill>
-              </a:rPr>
-              <a:t>. Select subcategories and views</a:t>
-            </a:r>
-            <a:endParaRPr lang="en-US" sz="1400" b="1" kern="0" dirty="0" smtClean="0">
-              <a:solidFill>
-                <a:srgbClr val="FF0000"/>
-              </a:solidFill>
-              <a:latin typeface="Verdana" pitchFamily="34" charset="0"/>
-              <a:ea typeface="Verdana" pitchFamily="34" charset="0"/>
-              <a:cs typeface="Verdana" pitchFamily="34" charset="0"/>
-            </a:endParaRPr>
+              <a:t>1. Select product category</a:t>
+            </a:r>
           </a:p>
         </p:txBody>
       </p:sp>
     </p:spTree>
     <p:extLst>
       <p:ext uri="{BB962C8B-B14F-4D97-AF65-F5344CB8AC3E}">
-        <p14:creationId xmlns:p14="http://schemas.microsoft.com/office/powerpoint/2010/main" val="2357151479"/>
+        <p14:creationId xmlns:p14="http://schemas.microsoft.com/office/powerpoint/2010/main" val="676193474"/>
       </p:ext>
     </p:extLst>
   </p:cSld>
@@ -12155,7 +12067,7 @@
         <p:spPr>
           <a:xfrm>
             <a:off x="-1" y="1143000"/>
-            <a:ext cx="9068295" cy="4419600"/>
+            <a:ext cx="9144001" cy="4343400"/>
           </a:xfrm>
         </p:spPr>
       </p:pic>
@@ -12246,14 +12158,14 @@
       </p:sp>
       <p:sp>
         <p:nvSpPr>
-          <p:cNvPr id="8" name="TextBox 7"/>
+          <p:cNvPr id="9" name="TextBox 8"/>
           <p:cNvSpPr txBox="1"/>
           <p:nvPr/>
         </p:nvSpPr>
         <p:spPr bwMode="auto">
           <a:xfrm>
-            <a:off x="2667000" y="5592203"/>
-            <a:ext cx="4800600" cy="861774"/>
+            <a:off x="4800600" y="5029200"/>
+            <a:ext cx="3429000" cy="1292662"/>
           </a:xfrm>
           <a:prstGeom prst="rect">
             <a:avLst/>
@@ -12269,6 +12181,84 @@
         </p:spPr>
         <p:txBody>
           <a:bodyPr wrap="square" lIns="0" tIns="0" rIns="0" bIns="0" rtlCol="0" anchor="ctr" anchorCtr="0">
+            <a:spAutoFit/>
+          </a:bodyPr>
+          <a:lstStyle/>
+          <a:p>
+            <a:pPr lvl="0"/>
+            <a:r>
+              <a:rPr lang="en-US" sz="1400" dirty="0">
+                <a:solidFill>
+                  <a:srgbClr val="FF0000"/>
+                </a:solidFill>
+              </a:rPr>
+              <a:t>I</a:t>
+            </a:r>
+            <a:r>
+              <a:rPr lang="en-US" sz="1400" dirty="0" smtClean="0">
+                <a:solidFill>
+                  <a:srgbClr val="FF0000"/>
+                </a:solidFill>
+              </a:rPr>
+              <a:t>nstantly </a:t>
+            </a:r>
+            <a:r>
+              <a:rPr lang="en-US" sz="1400" dirty="0">
+                <a:solidFill>
+                  <a:srgbClr val="FF0000"/>
+                </a:solidFill>
+              </a:rPr>
+              <a:t>switch views of the table, </a:t>
+            </a:r>
+            <a:r>
+              <a:rPr lang="en-US" sz="1400" dirty="0" smtClean="0">
+                <a:solidFill>
+                  <a:srgbClr val="FF0000"/>
+                </a:solidFill>
+              </a:rPr>
+              <a:t>exploring </a:t>
+            </a:r>
+            <a:r>
+              <a:rPr lang="en-US" sz="1400" dirty="0">
+                <a:solidFill>
+                  <a:srgbClr val="FF0000"/>
+                </a:solidFill>
+              </a:rPr>
+              <a:t>the portfolio in terms of various parameters. This gives a better understanding of the internal structure of the product portfolio, shows the areas of application of various technologies.</a:t>
+            </a:r>
+            <a:endParaRPr lang="ru-RU" sz="1400" dirty="0">
+              <a:solidFill>
+                <a:srgbClr val="FF0000"/>
+              </a:solidFill>
+            </a:endParaRPr>
+          </a:p>
+        </p:txBody>
+      </p:sp>
+      <p:sp>
+        <p:nvSpPr>
+          <p:cNvPr id="4" name="TextBox 3"/>
+          <p:cNvSpPr txBox="1"/>
+          <p:nvPr/>
+        </p:nvSpPr>
+        <p:spPr bwMode="auto">
+          <a:xfrm>
+            <a:off x="250824" y="463780"/>
+            <a:ext cx="3651641" cy="430887"/>
+          </a:xfrm>
+          <a:prstGeom prst="rect">
+            <a:avLst/>
+          </a:prstGeom>
+          <a:noFill/>
+          <a:ln w="9525">
+            <a:noFill/>
+            <a:miter lim="800000"/>
+            <a:headEnd/>
+            <a:tailEnd/>
+          </a:ln>
+          <a:effectLst/>
+        </p:spPr>
+        <p:txBody>
+          <a:bodyPr wrap="none" lIns="0" tIns="0" rIns="0" bIns="0" rtlCol="0" anchor="ctr" anchorCtr="0">
             <a:spAutoFit/>
           </a:bodyPr>
           <a:lstStyle/>
@@ -12287,53 +12277,38 @@
               <a:tabLst/>
             </a:pPr>
             <a:r>
-              <a:rPr lang="ru-RU" sz="1400" b="1" dirty="0" smtClean="0">
+              <a:rPr lang="en-US" sz="2800" kern="0" dirty="0" smtClean="0">
                 <a:solidFill>
                   <a:srgbClr val="FF0000"/>
                 </a:solidFill>
+                <a:latin typeface="Verdana" pitchFamily="34" charset="0"/>
+                <a:ea typeface="Verdana" pitchFamily="34" charset="0"/>
+                <a:cs typeface="Verdana" pitchFamily="34" charset="0"/>
               </a:rPr>
-              <a:t>3. </a:t>
-            </a:r>
-            <a:r>
-              <a:rPr lang="en-US" sz="1400" b="1" dirty="0">
-                <a:solidFill>
-                  <a:srgbClr val="FF0000"/>
-                </a:solidFill>
-              </a:rPr>
-              <a:t>Clicking on the table cells, you move through the component parameter tree, choosing a branch according to your technical requirements, up to a particular part number</a:t>
-            </a:r>
-            <a:endParaRPr lang="en-US" sz="1400" b="1" kern="0" dirty="0" smtClean="0">
-              <a:solidFill>
-                <a:srgbClr val="FF0000"/>
-              </a:solidFill>
-              <a:latin typeface="Verdana" pitchFamily="34" charset="0"/>
-              <a:ea typeface="Verdana" pitchFamily="34" charset="0"/>
-              <a:cs typeface="Verdana" pitchFamily="34" charset="0"/>
-            </a:endParaRPr>
+              <a:t>2. Choose viewpoint</a:t>
+            </a:r>
           </a:p>
         </p:txBody>
       </p:sp>
       <p:cxnSp>
         <p:nvCxnSpPr>
-          <p:cNvPr id="5" name="Straight Arrow Connector 4"/>
-          <p:cNvCxnSpPr>
-            <a:stCxn id="8" idx="0"/>
-          </p:cNvCxnSpPr>
+          <p:cNvPr id="10" name="Straight Arrow Connector 9"/>
+          <p:cNvCxnSpPr/>
           <p:nvPr/>
         </p:nvCxnSpPr>
         <p:spPr>
-          <a:xfrm flipV="1">
-            <a:off x="5067300" y="2895600"/>
-            <a:ext cx="342901" cy="2696603"/>
+          <a:xfrm flipH="1" flipV="1">
+            <a:off x="2057400" y="1828800"/>
+            <a:ext cx="2667000" cy="3200400"/>
           </a:xfrm>
           <a:prstGeom prst="straightConnector1">
             <a:avLst/>
           </a:prstGeom>
           <a:ln w="19050">
             <a:solidFill>
-              <a:srgbClr val="FF0000"/>
+              <a:schemeClr val="accent1"/>
             </a:solidFill>
-            <a:prstDash val="dash"/>
+            <a:prstDash val="sysDot"/>
             <a:tailEnd type="triangle"/>
           </a:ln>
         </p:spPr>
@@ -12354,25 +12329,23 @@
       </p:cxnSp>
       <p:cxnSp>
         <p:nvCxnSpPr>
-          <p:cNvPr id="10" name="Straight Arrow Connector 9"/>
-          <p:cNvCxnSpPr>
-            <a:stCxn id="8" idx="0"/>
-          </p:cNvCxnSpPr>
+          <p:cNvPr id="14" name="Straight Arrow Connector 13"/>
+          <p:cNvCxnSpPr/>
           <p:nvPr/>
         </p:nvCxnSpPr>
         <p:spPr>
           <a:xfrm flipH="1" flipV="1">
-            <a:off x="3581406" y="3124202"/>
-            <a:ext cx="1485894" cy="2468001"/>
+            <a:off x="1219200" y="1930689"/>
+            <a:ext cx="3505201" cy="3098512"/>
           </a:xfrm>
           <a:prstGeom prst="straightConnector1">
             <a:avLst/>
           </a:prstGeom>
           <a:ln w="19050">
             <a:solidFill>
-              <a:srgbClr val="FF0000"/>
+              <a:schemeClr val="accent1"/>
             </a:solidFill>
-            <a:prstDash val="dash"/>
+            <a:prstDash val="sysDot"/>
             <a:tailEnd type="triangle"/>
           </a:ln>
         </p:spPr>
@@ -12393,25 +12366,23 @@
       </p:cxnSp>
       <p:cxnSp>
         <p:nvCxnSpPr>
-          <p:cNvPr id="13" name="Straight Arrow Connector 12"/>
-          <p:cNvCxnSpPr>
-            <a:stCxn id="8" idx="0"/>
-          </p:cNvCxnSpPr>
+          <p:cNvPr id="17" name="Straight Arrow Connector 16"/>
+          <p:cNvCxnSpPr/>
           <p:nvPr/>
         </p:nvCxnSpPr>
         <p:spPr>
           <a:xfrm flipH="1" flipV="1">
-            <a:off x="3276608" y="3429002"/>
-            <a:ext cx="1790692" cy="2163201"/>
+            <a:off x="538860" y="1981200"/>
+            <a:ext cx="4185540" cy="3048002"/>
           </a:xfrm>
           <a:prstGeom prst="straightConnector1">
             <a:avLst/>
           </a:prstGeom>
           <a:ln w="19050">
             <a:solidFill>
-              <a:srgbClr val="FF0000"/>
+              <a:schemeClr val="accent1"/>
             </a:solidFill>
-            <a:prstDash val="dash"/>
+            <a:prstDash val="sysDot"/>
             <a:tailEnd type="triangle"/>
           </a:ln>
         </p:spPr>
@@ -12433,7 +12404,7 @@
     </p:spTree>
     <p:extLst>
       <p:ext uri="{BB962C8B-B14F-4D97-AF65-F5344CB8AC3E}">
-        <p14:creationId xmlns:p14="http://schemas.microsoft.com/office/powerpoint/2010/main" val="2876875689"/>
+        <p14:creationId xmlns:p14="http://schemas.microsoft.com/office/powerpoint/2010/main" val="2357151479"/>
       </p:ext>
     </p:extLst>
   </p:cSld>
@@ -12482,11 +12453,56 @@
           <a:bodyPr/>
           <a:lstStyle/>
           <a:p>
-            <a:r>
-              <a:rPr lang="en-US" smtClean="0"/>
+            <a:pPr marL="0" marR="0" lvl="0" indent="0" algn="ctr" defTabSz="914400" rtl="0" eaLnBrk="1" fontAlgn="t" latinLnBrk="0" hangingPunct="1">
+              <a:lnSpc>
+                <a:spcPct val="100000"/>
+              </a:lnSpc>
+              <a:spcBef>
+                <a:spcPct val="0"/>
+              </a:spcBef>
+              <a:spcAft>
+                <a:spcPct val="0"/>
+              </a:spcAft>
+              <a:buClr>
+                <a:srgbClr val="928285"/>
+              </a:buClr>
+              <a:buSzTx/>
+              <a:buFontTx/>
+              <a:buNone/>
+              <a:tabLst/>
+              <a:defRPr/>
+            </a:pPr>
+            <a:r>
+              <a:rPr kumimoji="0" lang="en-US" sz="800" b="0" i="0" u="none" strike="noStrike" kern="1200" cap="none" spc="0" normalizeH="0" baseline="0" noProof="0" smtClean="0">
+                <a:ln>
+                  <a:noFill/>
+                </a:ln>
+                <a:solidFill>
+                  <a:srgbClr val="928285"/>
+                </a:solidFill>
+                <a:effectLst/>
+                <a:uLnTx/>
+                <a:uFillTx/>
+                <a:latin typeface="Arial" panose="020B0604020202020204" pitchFamily="34" charset="0"/>
+                <a:ea typeface="+mn-ea"/>
+                <a:cs typeface="Verdana"/>
+              </a:rPr>
               <a:t>Copyright © Infineon Technologies AG 2019. All rights reserved.</a:t>
             </a:r>
-            <a:endParaRPr lang="en-US" dirty="0"/>
+            <a:endParaRPr kumimoji="0" lang="en-US" sz="800" b="0" i="0" u="none" strike="noStrike" kern="1200" cap="none" spc="0" normalizeH="0" baseline="0" noProof="0" dirty="0">
+              <a:ln>
+                <a:noFill/>
+              </a:ln>
+              <a:solidFill>
+                <a:srgbClr val="928285"/>
+              </a:solidFill>
+              <a:effectLst/>
+              <a:uLnTx/>
+              <a:uFillTx/>
+              <a:latin typeface="Arial" panose="020B0604020202020204" pitchFamily="34" charset="0"/>
+              <a:ea typeface="+mn-ea"/>
+              <a:cs typeface="Verdana"/>
+            </a:endParaRPr>
           </a:p>
         </p:txBody>
       </p:sp>
@@ -12505,23 +12521,115 @@
           <a:bodyPr/>
           <a:lstStyle/>
           <a:p>
+            <a:pPr marL="0" marR="0" lvl="0" indent="0" algn="r" defTabSz="914400" rtl="0" eaLnBrk="1" fontAlgn="t" latinLnBrk="0" hangingPunct="1">
+              <a:lnSpc>
+                <a:spcPct val="100000"/>
+              </a:lnSpc>
+              <a:spcBef>
+                <a:spcPct val="0"/>
+              </a:spcBef>
+              <a:spcAft>
+                <a:spcPct val="0"/>
+              </a:spcAft>
+              <a:buClr>
+                <a:srgbClr val="928285"/>
+              </a:buClr>
+              <a:buSzTx/>
+              <a:buFontTx/>
+              <a:buNone/>
+              <a:tabLst/>
+              <a:defRPr/>
+            </a:pPr>
             <a:fld id="{132FE172-F370-450B-9494-FD7900E1DA7D}" type="slidenum">
-              <a:rPr lang="en-US" smtClean="0"/>
-              <a:pPr/>
+              <a:rPr kumimoji="0" lang="en-US" sz="1200" b="0" i="0" u="none" strike="noStrike" kern="1200" cap="none" spc="0" normalizeH="0" baseline="0" noProof="0" smtClean="0">
+                <a:ln>
+                  <a:noFill/>
+                </a:ln>
+                <a:solidFill>
+                  <a:srgbClr val="FFFFFF"/>
+                </a:solidFill>
+                <a:effectLst/>
+                <a:uLnTx/>
+                <a:uFillTx/>
+                <a:latin typeface="Arial" panose="020B0604020202020204" pitchFamily="34" charset="0"/>
+                <a:ea typeface="+mn-ea"/>
+                <a:cs typeface="Verdana"/>
+              </a:rPr>
+              <a:pPr marL="0" marR="0" lvl="0" indent="0" algn="r" defTabSz="914400" rtl="0" eaLnBrk="1" fontAlgn="t" latinLnBrk="0" hangingPunct="1">
+                <a:lnSpc>
+                  <a:spcPct val="100000"/>
+                </a:lnSpc>
+                <a:spcBef>
+                  <a:spcPct val="0"/>
+                </a:spcBef>
+                <a:spcAft>
+                  <a:spcPct val="0"/>
+                </a:spcAft>
+                <a:buClr>
+                  <a:srgbClr val="928285"/>
+                </a:buClr>
+                <a:buSzTx/>
+                <a:buFontTx/>
+                <a:buNone/>
+                <a:tabLst/>
+                <a:defRPr/>
+              </a:pPr>
               <a:t>7</a:t>
             </a:fld>
-            <a:endParaRPr lang="en-US" dirty="0"/>
-          </a:p>
-        </p:txBody>
-      </p:sp>
-      <p:sp>
-        <p:nvSpPr>
-          <p:cNvPr id="4" name="Title 3"/>
-          <p:cNvSpPr>
-            <a:spLocks noGrp="1"/>
-          </p:cNvSpPr>
-          <p:nvPr>
-            <p:ph type="title"/>
+            <a:endParaRPr kumimoji="0" lang="en-US" sz="1200" b="0" i="0" u="none" strike="noStrike" kern="1200" cap="none" spc="0" normalizeH="0" baseline="0" noProof="0" dirty="0">
+              <a:ln>
+                <a:noFill/>
+              </a:ln>
+              <a:solidFill>
+                <a:srgbClr val="FFFFFF"/>
+              </a:solidFill>
+              <a:effectLst/>
+              <a:uLnTx/>
+              <a:uFillTx/>
+              <a:latin typeface="Arial" panose="020B0604020202020204" pitchFamily="34" charset="0"/>
+              <a:ea typeface="+mn-ea"/>
+              <a:cs typeface="Verdana"/>
+            </a:endParaRPr>
+          </a:p>
+        </p:txBody>
+      </p:sp>
+      <p:pic>
+        <p:nvPicPr>
+          <p:cNvPr id="7" name="Content Placeholder 6"/>
+          <p:cNvPicPr>
+            <a:picLocks noGrp="1" noChangeAspect="1"/>
+          </p:cNvPicPr>
+          <p:nvPr>
+            <p:ph sz="quarter" idx="13"/>
+          </p:nvPr>
+        </p:nvPicPr>
+        <p:blipFill>
+          <a:blip r:embed="rId2">
+            <a:extLst>
+              <a:ext uri="{28A0092B-C50C-407E-A947-70E740481C1C}">
+                <a14:useLocalDpi xmlns:a14="http://schemas.microsoft.com/office/drawing/2010/main" val="0"/>
+              </a:ext>
+            </a:extLst>
+          </a:blip>
+          <a:stretch>
+            <a:fillRect/>
+          </a:stretch>
+        </p:blipFill>
+        <p:spPr>
+          <a:xfrm>
+            <a:off x="-1" y="1143000"/>
+            <a:ext cx="9068295" cy="4419600"/>
+          </a:xfrm>
+        </p:spPr>
+      </p:pic>
+      <p:sp>
+        <p:nvSpPr>
+          <p:cNvPr id="6" name="Date Placeholder 5"/>
+          <p:cNvSpPr>
+            <a:spLocks noGrp="1"/>
+          </p:cNvSpPr>
+          <p:nvPr>
+            <p:ph type="dt" sz="half" idx="15"/>
           </p:nvPr>
         </p:nvSpPr>
         <p:spPr/>
@@ -12529,185 +12637,322 @@
           <a:bodyPr/>
           <a:lstStyle/>
           <a:p>
-            <a:r>
-              <a:rPr lang="en-US" dirty="0" smtClean="0"/>
-              <a:t>How to start?</a:t>
-            </a:r>
-            <a:endParaRPr lang="en-US" dirty="0"/>
-          </a:p>
-        </p:txBody>
-      </p:sp>
-      <p:sp>
-        <p:nvSpPr>
-          <p:cNvPr id="5" name="Content Placeholder 4"/>
-          <p:cNvSpPr>
-            <a:spLocks noGrp="1"/>
-          </p:cNvSpPr>
-          <p:nvPr>
-            <p:ph sz="quarter" idx="13"/>
-          </p:nvPr>
-        </p:nvSpPr>
-        <p:spPr/>
-        <p:txBody>
-          <a:bodyPr/>
+            <a:pPr marL="0" marR="0" lvl="0" indent="0" algn="l" defTabSz="914400" rtl="0" eaLnBrk="1" fontAlgn="t" latinLnBrk="0" hangingPunct="1">
+              <a:lnSpc>
+                <a:spcPct val="100000"/>
+              </a:lnSpc>
+              <a:spcBef>
+                <a:spcPct val="0"/>
+              </a:spcBef>
+              <a:spcAft>
+                <a:spcPct val="0"/>
+              </a:spcAft>
+              <a:buClr>
+                <a:srgbClr val="928285"/>
+              </a:buClr>
+              <a:buSzTx/>
+              <a:buFontTx/>
+              <a:buNone/>
+              <a:tabLst/>
+              <a:defRPr/>
+            </a:pPr>
+            <a:r>
+              <a:rPr kumimoji="0" lang="en-US" sz="800" b="0" i="0" u="none" strike="noStrike" kern="1200" cap="none" spc="0" normalizeH="0" baseline="0" noProof="0" smtClean="0">
+                <a:ln>
+                  <a:noFill/>
+                </a:ln>
+                <a:solidFill>
+                  <a:srgbClr val="928285"/>
+                </a:solidFill>
+                <a:effectLst/>
+                <a:uLnTx/>
+                <a:uFillTx/>
+                <a:latin typeface="Arial" panose="020B0604020202020204" pitchFamily="34" charset="0"/>
+                <a:ea typeface="+mn-ea"/>
+                <a:cs typeface="Verdana"/>
+              </a:rPr>
+              <a:t>Jan 2019             </a:t>
+            </a:r>
+            <a:r>
+              <a:rPr kumimoji="0" lang="en-US" sz="800" b="1" i="0" u="none" strike="noStrike" kern="1200" cap="none" spc="0" normalizeH="0" baseline="0" noProof="0" smtClean="0">
+                <a:ln>
+                  <a:noFill/>
+                </a:ln>
+                <a:solidFill>
+                  <a:srgbClr val="928285"/>
+                </a:solidFill>
+                <a:effectLst/>
+                <a:uLnTx/>
+                <a:uFillTx/>
+                <a:latin typeface="Arial" panose="020B0604020202020204" pitchFamily="34" charset="0"/>
+                <a:ea typeface="+mn-ea"/>
+                <a:cs typeface="Verdana"/>
+              </a:rPr>
+              <a:t>restricted</a:t>
+            </a:r>
+            <a:endParaRPr kumimoji="0" lang="en-US" sz="800" b="1" i="0" u="none" strike="noStrike" kern="1200" cap="none" spc="0" normalizeH="0" baseline="0" noProof="0" dirty="0">
+              <a:ln>
+                <a:noFill/>
+              </a:ln>
+              <a:solidFill>
+                <a:srgbClr val="928285"/>
+              </a:solidFill>
+              <a:effectLst/>
+              <a:uLnTx/>
+              <a:uFillTx/>
+              <a:latin typeface="Arial" panose="020B0604020202020204" pitchFamily="34" charset="0"/>
+              <a:ea typeface="+mn-ea"/>
+              <a:cs typeface="Verdana"/>
+            </a:endParaRPr>
+          </a:p>
+        </p:txBody>
+      </p:sp>
+      <p:sp>
+        <p:nvSpPr>
+          <p:cNvPr id="8" name="TextBox 7"/>
+          <p:cNvSpPr txBox="1"/>
+          <p:nvPr/>
+        </p:nvSpPr>
+        <p:spPr bwMode="auto">
+          <a:xfrm>
+            <a:off x="2667000" y="5699924"/>
+            <a:ext cx="4800600" cy="646331"/>
+          </a:xfrm>
+          <a:prstGeom prst="rect">
+            <a:avLst/>
+          </a:prstGeom>
+          <a:noFill/>
+          <a:ln w="9525">
+            <a:noFill/>
+            <a:miter lim="800000"/>
+            <a:headEnd/>
+            <a:tailEnd/>
+          </a:ln>
+          <a:effectLst/>
+        </p:spPr>
+        <p:txBody>
+          <a:bodyPr wrap="square" lIns="0" tIns="0" rIns="0" bIns="0" rtlCol="0" anchor="ctr" anchorCtr="0">
+            <a:spAutoFit/>
+          </a:bodyPr>
           <a:lstStyle/>
           <a:p>
-            <a:pPr marL="0" indent="0">
-              <a:buNone/>
+            <a:pPr marR="0" defTabSz="914400" eaLnBrk="0" fontAlgn="auto" latinLnBrk="0" hangingPunct="0">
+              <a:spcBef>
+                <a:spcPts val="0"/>
+              </a:spcBef>
+              <a:spcAft>
+                <a:spcPts val="300"/>
+              </a:spcAft>
+              <a:buClr>
+                <a:schemeClr val="accent1"/>
+              </a:buClr>
+              <a:buSzTx/>
+              <a:tabLst/>
             </a:pPr>
             <a:r>
-              <a:rPr lang="en-US" dirty="0"/>
-              <a:t>The </a:t>
-            </a:r>
-            <a:r>
-              <a:rPr lang="en-US" dirty="0" smtClean="0"/>
-              <a:t>tool </a:t>
-            </a:r>
-            <a:r>
-              <a:rPr lang="en-US" dirty="0"/>
-              <a:t>does not require any installation of additional programs on your computer. It is enough to copy the folder with the tool in a convenient place and open the start page (index.html) in a web browser.</a:t>
-            </a:r>
-            <a:endParaRPr lang="ru-RU" dirty="0"/>
-          </a:p>
-          <a:p>
-            <a:pPr marL="457200" lvl="0" indent="-457200">
-              <a:buFont typeface="+mj-lt"/>
-              <a:buAutoNum type="arabicPeriod"/>
+              <a:rPr lang="en-US" sz="1400" dirty="0" smtClean="0">
+                <a:solidFill>
+                  <a:srgbClr val="FF0000"/>
+                </a:solidFill>
+              </a:rPr>
+              <a:t>Clicking </a:t>
+            </a:r>
+            <a:r>
+              <a:rPr lang="en-US" sz="1400" dirty="0">
+                <a:solidFill>
+                  <a:srgbClr val="FF0000"/>
+                </a:solidFill>
+              </a:rPr>
+              <a:t>on the table cells, you move through the component parameter tree, choosing a branch according to your technical requirements, up to a particular part number</a:t>
+            </a:r>
+            <a:endParaRPr lang="en-US" sz="1400" kern="0" dirty="0" smtClean="0">
+              <a:solidFill>
+                <a:srgbClr val="FF0000"/>
+              </a:solidFill>
+              <a:latin typeface="Verdana" pitchFamily="34" charset="0"/>
+              <a:ea typeface="Verdana" pitchFamily="34" charset="0"/>
+              <a:cs typeface="Verdana" pitchFamily="34" charset="0"/>
+            </a:endParaRPr>
+          </a:p>
+        </p:txBody>
+      </p:sp>
+      <p:cxnSp>
+        <p:nvCxnSpPr>
+          <p:cNvPr id="5" name="Straight Arrow Connector 4"/>
+          <p:cNvCxnSpPr>
+            <a:stCxn id="8" idx="0"/>
+          </p:cNvCxnSpPr>
+          <p:nvPr/>
+        </p:nvCxnSpPr>
+        <p:spPr>
+          <a:xfrm flipV="1">
+            <a:off x="5067300" y="2895601"/>
+            <a:ext cx="342901" cy="2804323"/>
+          </a:xfrm>
+          <a:prstGeom prst="straightConnector1">
+            <a:avLst/>
+          </a:prstGeom>
+          <a:ln w="19050">
+            <a:solidFill>
+              <a:srgbClr val="FF0000"/>
+            </a:solidFill>
+            <a:prstDash val="sysDot"/>
+            <a:tailEnd type="triangle"/>
+          </a:ln>
+        </p:spPr>
+        <p:style>
+          <a:lnRef idx="1">
+            <a:schemeClr val="accent1"/>
+          </a:lnRef>
+          <a:fillRef idx="0">
+            <a:schemeClr val="accent1"/>
+          </a:fillRef>
+          <a:effectRef idx="0">
+            <a:schemeClr val="accent1"/>
+          </a:effectRef>
+          <a:fontRef idx="minor">
+            <a:schemeClr val="tx1"/>
+          </a:fontRef>
+        </p:style>
+      </p:cxnSp>
+      <p:cxnSp>
+        <p:nvCxnSpPr>
+          <p:cNvPr id="10" name="Straight Arrow Connector 9"/>
+          <p:cNvCxnSpPr>
+            <a:stCxn id="8" idx="0"/>
+          </p:cNvCxnSpPr>
+          <p:nvPr/>
+        </p:nvCxnSpPr>
+        <p:spPr>
+          <a:xfrm flipH="1" flipV="1">
+            <a:off x="3581406" y="3124203"/>
+            <a:ext cx="1485894" cy="2575721"/>
+          </a:xfrm>
+          <a:prstGeom prst="straightConnector1">
+            <a:avLst/>
+          </a:prstGeom>
+          <a:ln w="19050">
+            <a:solidFill>
+              <a:srgbClr val="FF0000"/>
+            </a:solidFill>
+            <a:prstDash val="sysDot"/>
+            <a:tailEnd type="triangle"/>
+          </a:ln>
+        </p:spPr>
+        <p:style>
+          <a:lnRef idx="1">
+            <a:schemeClr val="accent1"/>
+          </a:lnRef>
+          <a:fillRef idx="0">
+            <a:schemeClr val="accent1"/>
+          </a:fillRef>
+          <a:effectRef idx="0">
+            <a:schemeClr val="accent1"/>
+          </a:effectRef>
+          <a:fontRef idx="minor">
+            <a:schemeClr val="tx1"/>
+          </a:fontRef>
+        </p:style>
+      </p:cxnSp>
+      <p:cxnSp>
+        <p:nvCxnSpPr>
+          <p:cNvPr id="13" name="Straight Arrow Connector 12"/>
+          <p:cNvCxnSpPr>
+            <a:stCxn id="8" idx="0"/>
+          </p:cNvCxnSpPr>
+          <p:nvPr/>
+        </p:nvCxnSpPr>
+        <p:spPr>
+          <a:xfrm flipH="1" flipV="1">
+            <a:off x="3276608" y="3429003"/>
+            <a:ext cx="1790692" cy="2270921"/>
+          </a:xfrm>
+          <a:prstGeom prst="straightConnector1">
+            <a:avLst/>
+          </a:prstGeom>
+          <a:ln w="19050">
+            <a:solidFill>
+              <a:srgbClr val="FF0000"/>
+            </a:solidFill>
+            <a:prstDash val="sysDot"/>
+            <a:tailEnd type="triangle"/>
+          </a:ln>
+        </p:spPr>
+        <p:style>
+          <a:lnRef idx="1">
+            <a:schemeClr val="accent1"/>
+          </a:lnRef>
+          <a:fillRef idx="0">
+            <a:schemeClr val="accent1"/>
+          </a:fillRef>
+          <a:effectRef idx="0">
+            <a:schemeClr val="accent1"/>
+          </a:effectRef>
+          <a:fontRef idx="minor">
+            <a:schemeClr val="tx1"/>
+          </a:fontRef>
+        </p:style>
+      </p:cxnSp>
+      <p:sp>
+        <p:nvSpPr>
+          <p:cNvPr id="4" name="TextBox 3"/>
+          <p:cNvSpPr txBox="1"/>
+          <p:nvPr/>
+        </p:nvSpPr>
+        <p:spPr bwMode="auto">
+          <a:xfrm>
+            <a:off x="253755" y="515044"/>
+            <a:ext cx="4784964" cy="307777"/>
+          </a:xfrm>
+          <a:prstGeom prst="rect">
+            <a:avLst/>
+          </a:prstGeom>
+          <a:noFill/>
+          <a:ln w="9525">
+            <a:noFill/>
+            <a:miter lim="800000"/>
+            <a:headEnd/>
+            <a:tailEnd/>
+          </a:ln>
+          <a:effectLst/>
+        </p:spPr>
+        <p:txBody>
+          <a:bodyPr wrap="none" lIns="0" tIns="0" rIns="0" bIns="0" rtlCol="0" anchor="ctr" anchorCtr="0">
+            <a:spAutoFit/>
+          </a:bodyPr>
+          <a:lstStyle/>
+          <a:p>
+            <a:pPr marR="0" defTabSz="914400" eaLnBrk="0" fontAlgn="auto" latinLnBrk="0" hangingPunct="0">
+              <a:spcBef>
+                <a:spcPts val="0"/>
+              </a:spcBef>
+              <a:spcAft>
+                <a:spcPts val="300"/>
+              </a:spcAft>
+              <a:buClr>
+                <a:schemeClr val="accent1"/>
+              </a:buClr>
+              <a:buSzTx/>
+              <a:tabLst/>
             </a:pPr>
             <a:r>
-              <a:rPr lang="en-US" dirty="0"/>
-              <a:t>Download the latest version of the tool from </a:t>
-            </a:r>
-            <a:r>
-              <a:rPr lang="en-US" dirty="0" err="1"/>
-              <a:t>myInfineon</a:t>
-            </a:r>
-            <a:r>
-              <a:rPr lang="en-US" dirty="0"/>
-              <a:t> OR from github.com:</a:t>
-            </a:r>
-            <a:endParaRPr lang="ru-RU" dirty="0"/>
-          </a:p>
-          <a:p>
-            <a:pPr lvl="1"/>
-            <a:r>
-              <a:rPr lang="en-US" dirty="0"/>
-              <a:t>Option 1 (recommended) - </a:t>
-            </a:r>
-            <a:r>
-              <a:rPr lang="en-US" dirty="0" err="1"/>
-              <a:t>myInfineon</a:t>
-            </a:r>
-            <a:r>
-              <a:rPr lang="en-US" dirty="0"/>
-              <a:t>: Login to </a:t>
-            </a:r>
-            <a:r>
-              <a:rPr lang="en-US" dirty="0" err="1"/>
-              <a:t>myInfineon</a:t>
-            </a:r>
-            <a:r>
-              <a:rPr lang="en-US" dirty="0"/>
-              <a:t>, on the right panel open </a:t>
-            </a:r>
-            <a:r>
-              <a:rPr lang="en-US" b="1" dirty="0"/>
-              <a:t>Simulation and Tools</a:t>
-            </a:r>
-            <a:r>
-              <a:rPr lang="en-US" dirty="0"/>
-              <a:t> menu, Click on </a:t>
-            </a:r>
-            <a:r>
-              <a:rPr lang="en-US" b="1" dirty="0"/>
-              <a:t>Smart Product Selection Map</a:t>
-            </a:r>
-            <a:endParaRPr lang="ru-RU" dirty="0"/>
-          </a:p>
-          <a:p>
-            <a:pPr lvl="1"/>
-            <a:r>
-              <a:rPr lang="en-US" dirty="0"/>
-              <a:t>Option 2 - </a:t>
-            </a:r>
-            <a:r>
-              <a:rPr lang="en-US" dirty="0" err="1"/>
-              <a:t>Github</a:t>
-            </a:r>
-            <a:r>
-              <a:rPr lang="en-US" dirty="0"/>
-              <a:t>: Download zip file at </a:t>
-            </a:r>
-            <a:r>
-              <a:rPr lang="en-US" u="sng" dirty="0">
-                <a:hlinkClick r:id="rId2"/>
+              <a:rPr lang="en-US" sz="2000" kern="0" dirty="0" smtClean="0">
+                <a:solidFill>
+                  <a:srgbClr val="FF0000"/>
+                </a:solidFill>
+                <a:latin typeface="Verdana" pitchFamily="34" charset="0"/>
+                <a:ea typeface="Verdana" pitchFamily="34" charset="0"/>
+                <a:cs typeface="Verdana" pitchFamily="34" charset="0"/>
               </a:rPr>
-              <a:t>https://github.com/vbasov007/Smart_Product_Selection_Map/archive/master.zip</a:t>
-            </a:r>
-            <a:r>
-              <a:rPr lang="en-US" dirty="0"/>
-              <a:t> </a:t>
-            </a:r>
-            <a:endParaRPr lang="ru-RU" dirty="0"/>
-          </a:p>
-          <a:p>
-            <a:pPr marL="457200" lvl="0" indent="-457200">
-              <a:buFont typeface="+mj-lt"/>
-              <a:buAutoNum type="arabicPeriod"/>
-            </a:pPr>
-            <a:r>
-              <a:rPr lang="en-US" dirty="0"/>
-              <a:t>Unzip the archive to a convenient place.</a:t>
-            </a:r>
-            <a:endParaRPr lang="ru-RU" dirty="0"/>
-          </a:p>
-          <a:p>
-            <a:pPr marL="457200" lvl="0" indent="-457200">
-              <a:buFont typeface="+mj-lt"/>
-              <a:buAutoNum type="arabicPeriod"/>
-            </a:pPr>
-            <a:r>
-              <a:rPr lang="en-US" dirty="0"/>
-              <a:t>Go to the folder and open the index.html file in the browser (supported: Chrome, Firefox, Opera, Safari and EDGE).</a:t>
-            </a:r>
-            <a:endParaRPr lang="ru-RU" dirty="0"/>
-          </a:p>
-          <a:p>
-            <a:endParaRPr lang="en-US" dirty="0"/>
-          </a:p>
-        </p:txBody>
-      </p:sp>
-      <p:sp>
-        <p:nvSpPr>
-          <p:cNvPr id="6" name="Date Placeholder 5"/>
-          <p:cNvSpPr>
-            <a:spLocks noGrp="1"/>
-          </p:cNvSpPr>
-          <p:nvPr>
-            <p:ph type="dt" sz="half" idx="15"/>
-          </p:nvPr>
-        </p:nvSpPr>
-        <p:spPr/>
-        <p:txBody>
-          <a:bodyPr/>
-          <a:lstStyle/>
-          <a:p>
-            <a:r>
-              <a:rPr lang="en-US" smtClean="0"/>
-              <a:t>Jan 2019             </a:t>
-            </a:r>
-            <a:r>
-              <a:rPr lang="en-US" b="1" smtClean="0"/>
-              <a:t>restricted</a:t>
-            </a:r>
-            <a:endParaRPr lang="en-US" b="1" dirty="0"/>
+              <a:t>3. Travel through the parameter tree</a:t>
+            </a:r>
           </a:p>
         </p:txBody>
       </p:sp>
     </p:spTree>
     <p:extLst>
       <p:ext uri="{BB962C8B-B14F-4D97-AF65-F5344CB8AC3E}">
-        <p14:creationId xmlns:p14="http://schemas.microsoft.com/office/powerpoint/2010/main" val="2983679562"/>
+        <p14:creationId xmlns:p14="http://schemas.microsoft.com/office/powerpoint/2010/main" val="2876875689"/>
       </p:ext>
     </p:extLst>
   </p:cSld>
@@ -12817,78 +13062,108 @@
       </p:sp>
       <p:sp>
         <p:nvSpPr>
-          <p:cNvPr id="5" name="Rectangle 4"/>
-          <p:cNvSpPr/>
+          <p:cNvPr id="5" name="TextBox 4"/>
+          <p:cNvSpPr txBox="1"/>
           <p:nvPr/>
         </p:nvSpPr>
-        <p:spPr>
-          <a:xfrm>
-            <a:off x="1295400" y="2644170"/>
-            <a:ext cx="6705600" cy="1938992"/>
+        <p:spPr bwMode="auto">
+          <a:xfrm>
+            <a:off x="2646269" y="1447800"/>
+            <a:ext cx="3818353" cy="677108"/>
           </a:xfrm>
           <a:prstGeom prst="rect">
             <a:avLst/>
           </a:prstGeom>
-        </p:spPr>
-        <p:txBody>
-          <a:bodyPr wrap="square">
+          <a:noFill/>
+          <a:ln w="9525">
+            <a:noFill/>
+            <a:miter lim="800000"/>
+            <a:headEnd/>
+            <a:tailEnd/>
+          </a:ln>
+          <a:effectLst/>
+        </p:spPr>
+        <p:txBody>
+          <a:bodyPr wrap="none" lIns="0" tIns="0" rIns="0" bIns="0" rtlCol="0" anchor="ctr" anchorCtr="0">
             <a:spAutoFit/>
           </a:bodyPr>
           <a:lstStyle/>
           <a:p>
-            <a:pPr algn="ctr"/>
-            <a:r>
-              <a:rPr lang="en-US" dirty="0" smtClean="0">
-                <a:hlinkClick r:id="rId2"/>
+            <a:pPr marR="0" defTabSz="914400" eaLnBrk="0" fontAlgn="auto" latinLnBrk="0" hangingPunct="0">
+              <a:spcBef>
+                <a:spcPts val="0"/>
+              </a:spcBef>
+              <a:spcAft>
+                <a:spcPts val="300"/>
+              </a:spcAft>
+              <a:buClr>
+                <a:schemeClr val="accent1"/>
+              </a:buClr>
+              <a:buSzTx/>
+              <a:tabLst/>
+            </a:pPr>
+            <a:r>
+              <a:rPr lang="en-US" sz="4400" kern="0" dirty="0" smtClean="0">
+                <a:latin typeface="Verdana" pitchFamily="34" charset="0"/>
+                <a:ea typeface="Verdana" pitchFamily="34" charset="0"/>
+                <a:cs typeface="Verdana" pitchFamily="34" charset="0"/>
               </a:rPr>
-              <a:t>Vasily.Basov@infineon.com</a:t>
-            </a:r>
-            <a:endParaRPr lang="en-US" dirty="0" smtClean="0"/>
-          </a:p>
-          <a:p>
-            <a:pPr algn="ctr"/>
-            <a:endParaRPr lang="en-US" dirty="0"/>
-          </a:p>
-          <a:p>
-            <a:pPr algn="ctr"/>
-            <a:endParaRPr lang="en-US" dirty="0"/>
-          </a:p>
-          <a:p>
-            <a:pPr algn="ctr"/>
-            <a:r>
-              <a:rPr lang="en-US" b="1" dirty="0">
+              <a:t>How to start?</a:t>
+            </a:r>
+          </a:p>
+        </p:txBody>
+      </p:sp>
+      <p:pic>
+        <p:nvPicPr>
+          <p:cNvPr id="3076" name="Picture 4" descr="Image result for instruction icon"/>
+          <p:cNvPicPr>
+            <a:picLocks noChangeAspect="1" noChangeArrowheads="1"/>
+          </p:cNvPicPr>
+          <p:nvPr/>
+        </p:nvPicPr>
+        <p:blipFill>
+          <a:blip r:embed="rId2">
+            <a:extLst>
+              <a:ext uri="{28A0092B-C50C-407E-A947-70E740481C1C}">
+                <a14:useLocalDpi xmlns:a14="http://schemas.microsoft.com/office/drawing/2010/main" val="0"/>
+              </a:ext>
+            </a:extLst>
+          </a:blip>
+          <a:srcRect/>
+          <a:stretch>
+            <a:fillRect/>
+          </a:stretch>
+        </p:blipFill>
+        <p:spPr bwMode="auto">
+          <a:xfrm>
+            <a:off x="2699317" y="2594294"/>
+            <a:ext cx="3712255" cy="3489520"/>
+          </a:xfrm>
+          <a:prstGeom prst="rect">
+            <a:avLst/>
+          </a:prstGeom>
+          <a:noFill/>
+          <a:extLst>
+            <a:ext uri="{909E8E84-426E-40DD-AFC4-6F175D3DCCD1}">
+              <a14:hiddenFill xmlns:a14="http://schemas.microsoft.com/office/drawing/2010/main">
                 <a:solidFill>
-                  <a:srgbClr val="FF0000"/>
+                  <a:srgbClr val="FFFFFF"/>
                 </a:solidFill>
-              </a:rPr>
-              <a:t>Please send me your feedback, comments, and suggestions!</a:t>
-            </a:r>
-            <a:endParaRPr lang="en-US" dirty="0">
-              <a:solidFill>
-                <a:srgbClr val="FF0000"/>
-              </a:solidFill>
-              <a:effectLst/>
-            </a:endParaRPr>
-          </a:p>
-        </p:txBody>
-      </p:sp>
+              </a14:hiddenFill>
+            </a:ext>
+          </a:extLst>
+        </p:spPr>
+      </p:pic>
     </p:spTree>
     <p:extLst>
       <p:ext uri="{BB962C8B-B14F-4D97-AF65-F5344CB8AC3E}">
-        <p14:creationId xmlns:p14="http://schemas.microsoft.com/office/powerpoint/2010/main" val="2538154561"/>
+        <p14:creationId xmlns:p14="http://schemas.microsoft.com/office/powerpoint/2010/main" val="2216443923"/>
       </p:ext>
     </p:extLst>
   </p:cSld>
   <p:clrMapOvr>
     <a:masterClrMapping/>
   </p:clrMapOvr>
-  <p:timing>
-    <p:tnLst>
-      <p:par>
-        <p:cTn id="1" dur="indefinite" restart="never" nodeType="tmRoot"/>
-      </p:par>
-    </p:tnLst>
-  </p:timing>
 </p:sld>
 </file>
 
@@ -12909,10 +13184,247 @@
           <a:chExt cx="0" cy="0"/>
         </a:xfrm>
       </p:grpSpPr>
+      <p:sp>
+        <p:nvSpPr>
+          <p:cNvPr id="2" name="Footer Placeholder 1"/>
+          <p:cNvSpPr>
+            <a:spLocks noGrp="1"/>
+          </p:cNvSpPr>
+          <p:nvPr>
+            <p:ph type="ftr" sz="quarter" idx="16"/>
+          </p:nvPr>
+        </p:nvSpPr>
+        <p:spPr/>
+        <p:txBody>
+          <a:bodyPr/>
+          <a:lstStyle/>
+          <a:p>
+            <a:r>
+              <a:rPr lang="en-US" smtClean="0"/>
+              <a:t>Copyright © Infineon Technologies AG 2019. All rights reserved.</a:t>
+            </a:r>
+            <a:endParaRPr lang="en-US" dirty="0"/>
+          </a:p>
+        </p:txBody>
+      </p:sp>
+      <p:sp>
+        <p:nvSpPr>
+          <p:cNvPr id="3" name="Slide Number Placeholder 2"/>
+          <p:cNvSpPr>
+            <a:spLocks noGrp="1"/>
+          </p:cNvSpPr>
+          <p:nvPr>
+            <p:ph type="sldNum" sz="quarter" idx="14"/>
+          </p:nvPr>
+        </p:nvSpPr>
+        <p:spPr/>
+        <p:txBody>
+          <a:bodyPr/>
+          <a:lstStyle/>
+          <a:p>
+            <a:fld id="{132FE172-F370-450B-9494-FD7900E1DA7D}" type="slidenum">
+              <a:rPr lang="en-US" smtClean="0"/>
+              <a:pPr/>
+              <a:t>9</a:t>
+            </a:fld>
+            <a:endParaRPr lang="en-US" dirty="0"/>
+          </a:p>
+        </p:txBody>
+      </p:sp>
+      <p:sp>
+        <p:nvSpPr>
+          <p:cNvPr id="4" name="Title 3"/>
+          <p:cNvSpPr>
+            <a:spLocks noGrp="1"/>
+          </p:cNvSpPr>
+          <p:nvPr>
+            <p:ph type="title"/>
+          </p:nvPr>
+        </p:nvSpPr>
+        <p:spPr/>
+        <p:txBody>
+          <a:bodyPr/>
+          <a:lstStyle/>
+          <a:p>
+            <a:r>
+              <a:rPr lang="en-US" dirty="0" smtClean="0"/>
+              <a:t>Instruction</a:t>
+            </a:r>
+            <a:endParaRPr lang="en-US" dirty="0"/>
+          </a:p>
+        </p:txBody>
+      </p:sp>
+      <p:sp>
+        <p:nvSpPr>
+          <p:cNvPr id="5" name="Content Placeholder 4"/>
+          <p:cNvSpPr>
+            <a:spLocks noGrp="1"/>
+          </p:cNvSpPr>
+          <p:nvPr>
+            <p:ph sz="quarter" idx="13"/>
+          </p:nvPr>
+        </p:nvSpPr>
+        <p:spPr/>
+        <p:txBody>
+          <a:bodyPr/>
+          <a:lstStyle/>
+          <a:p>
+            <a:pPr marL="0" indent="0">
+              <a:buNone/>
+            </a:pPr>
+            <a:r>
+              <a:rPr lang="en-US" dirty="0"/>
+              <a:t>The </a:t>
+            </a:r>
+            <a:r>
+              <a:rPr lang="en-US" dirty="0" smtClean="0"/>
+              <a:t>tool </a:t>
+            </a:r>
+            <a:r>
+              <a:rPr lang="en-US" dirty="0"/>
+              <a:t>does not require any installation of additional programs on your computer. It is enough to copy the folder with the tool in a convenient place and open the start page (index.html) in a web browser.</a:t>
+            </a:r>
+            <a:endParaRPr lang="ru-RU" dirty="0"/>
+          </a:p>
+          <a:p>
+            <a:pPr marL="457200" lvl="0" indent="-457200">
+              <a:buFont typeface="+mj-lt"/>
+              <a:buAutoNum type="arabicPeriod"/>
+            </a:pPr>
+            <a:r>
+              <a:rPr lang="en-US" dirty="0"/>
+              <a:t>Download the latest version of the tool from </a:t>
+            </a:r>
+            <a:r>
+              <a:rPr lang="en-US" dirty="0" err="1"/>
+              <a:t>myInfineon</a:t>
+            </a:r>
+            <a:r>
+              <a:rPr lang="en-US" dirty="0"/>
+              <a:t> OR from github.com:</a:t>
+            </a:r>
+            <a:endParaRPr lang="ru-RU" dirty="0"/>
+          </a:p>
+          <a:p>
+            <a:pPr lvl="1"/>
+            <a:r>
+              <a:rPr lang="en-US" dirty="0"/>
+              <a:t>Option 1 (recommended) - </a:t>
+            </a:r>
+            <a:r>
+              <a:rPr lang="en-US" dirty="0" err="1"/>
+              <a:t>myInfineon</a:t>
+            </a:r>
+            <a:r>
+              <a:rPr lang="en-US" dirty="0"/>
+              <a:t>: Login to </a:t>
+            </a:r>
+            <a:r>
+              <a:rPr lang="en-US" dirty="0" err="1"/>
+              <a:t>myInfineon</a:t>
+            </a:r>
+            <a:r>
+              <a:rPr lang="en-US" dirty="0"/>
+              <a:t>, on the right panel open </a:t>
+            </a:r>
+            <a:r>
+              <a:rPr lang="en-US" b="1" dirty="0"/>
+              <a:t>Simulation and Tools</a:t>
+            </a:r>
+            <a:r>
+              <a:rPr lang="en-US" dirty="0"/>
+              <a:t> menu, Click on </a:t>
+            </a:r>
+            <a:r>
+              <a:rPr lang="en-US" b="1" dirty="0"/>
+              <a:t>Smart Product Selection Map</a:t>
+            </a:r>
+            <a:endParaRPr lang="ru-RU" dirty="0"/>
+          </a:p>
+          <a:p>
+            <a:pPr lvl="1"/>
+            <a:r>
+              <a:rPr lang="en-US" dirty="0"/>
+              <a:t>Option 2 </a:t>
+            </a:r>
+            <a:r>
+              <a:rPr lang="en-US" dirty="0" err="1" smtClean="0"/>
+              <a:t>Github</a:t>
+            </a:r>
+            <a:r>
+              <a:rPr lang="en-US" dirty="0"/>
+              <a:t>: Download zip file at </a:t>
+            </a:r>
+            <a:r>
+              <a:rPr lang="en-US" u="sng" dirty="0">
+                <a:hlinkClick r:id="rId2"/>
+              </a:rPr>
+              <a:t>https://github.com/vbasov007/Smart_Product_Selection_Map/archive/master.zip</a:t>
+            </a:r>
+            <a:r>
+              <a:rPr lang="en-US" dirty="0"/>
+              <a:t> </a:t>
+            </a:r>
+            <a:endParaRPr lang="ru-RU" dirty="0"/>
+          </a:p>
+          <a:p>
+            <a:pPr marL="457200" lvl="0" indent="-457200">
+              <a:buFont typeface="+mj-lt"/>
+              <a:buAutoNum type="arabicPeriod"/>
+            </a:pPr>
+            <a:r>
+              <a:rPr lang="en-US" dirty="0"/>
+              <a:t>Unzip the archive to a convenient place.</a:t>
+            </a:r>
+            <a:endParaRPr lang="ru-RU" dirty="0"/>
+          </a:p>
+          <a:p>
+            <a:pPr marL="457200" lvl="0" indent="-457200">
+              <a:buFont typeface="+mj-lt"/>
+              <a:buAutoNum type="arabicPeriod"/>
+            </a:pPr>
+            <a:r>
+              <a:rPr lang="en-US" dirty="0"/>
+              <a:t>Go to the folder and open the index.html file in the browser (supported: Chrome, Firefox, Opera, Safari and EDGE).</a:t>
+            </a:r>
+            <a:endParaRPr lang="ru-RU" dirty="0"/>
+          </a:p>
+          <a:p>
+            <a:endParaRPr lang="en-US" dirty="0"/>
+          </a:p>
+        </p:txBody>
+      </p:sp>
+      <p:sp>
+        <p:nvSpPr>
+          <p:cNvPr id="6" name="Date Placeholder 5"/>
+          <p:cNvSpPr>
+            <a:spLocks noGrp="1"/>
+          </p:cNvSpPr>
+          <p:nvPr>
+            <p:ph type="dt" sz="half" idx="15"/>
+          </p:nvPr>
+        </p:nvSpPr>
+        <p:spPr/>
+        <p:txBody>
+          <a:bodyPr/>
+          <a:lstStyle/>
+          <a:p>
+            <a:r>
+              <a:rPr lang="en-US" smtClean="0"/>
+              <a:t>Jan 2019             </a:t>
+            </a:r>
+            <a:r>
+              <a:rPr lang="en-US" b="1" smtClean="0"/>
+              <a:t>restricted</a:t>
+            </a:r>
+            <a:endParaRPr lang="en-US" b="1" dirty="0"/>
+          </a:p>
+        </p:txBody>
+      </p:sp>
     </p:spTree>
     <p:extLst>
       <p:ext uri="{BB962C8B-B14F-4D97-AF65-F5344CB8AC3E}">
-        <p14:creationId xmlns:p14="http://schemas.microsoft.com/office/powerpoint/2010/main" val="3310874723"/>
+        <p14:creationId xmlns:p14="http://schemas.microsoft.com/office/powerpoint/2010/main" val="2983679562"/>
       </p:ext>
     </p:extLst>
   </p:cSld>
@@ -13705,6 +14217,15 @@
 </file>
 
 <file path=customXml/item1.xml><?xml version="1.0" encoding="utf-8"?>
+<?mso-contentType ?>
+<FormTemplates xmlns="http://schemas.microsoft.com/sharepoint/v3/contenttype/forms">
+  <Display>DocumentLibraryForm</Display>
+  <Edit>DocumentLibraryForm</Edit>
+  <New>DocumentLibraryForm</New>
+</FormTemplates>
+</file>
+
+<file path=customXml/item2.xml><?xml version="1.0" encoding="utf-8"?>
 <ct:contentTypeSchema xmlns:ct="http://schemas.microsoft.com/office/2006/metadata/contentType" xmlns:ma="http://schemas.microsoft.com/office/2006/metadata/properties/metaAttributes" ct:_="" ma:_="" ma:contentTypeName="Document" ma:contentTypeID="0x010100A655AAE9148B404486CBFDD74AD2AA0B" ma:contentTypeVersion="2" ma:contentTypeDescription="Create a new document." ma:contentTypeScope="" ma:versionID="a24cc1775e4f53b56bd6bf310015a115">
   <xsd:schema xmlns:xsd="http://www.w3.org/2001/XMLSchema" xmlns:xs="http://www.w3.org/2001/XMLSchema" xmlns:p="http://schemas.microsoft.com/office/2006/metadata/properties" xmlns:ns2="a709603d-609a-478b-a91d-3c5e984c0e79" xmlns:ns3="6ef45842-284e-44e4-b2db-1749e7948b44" targetNamespace="http://schemas.microsoft.com/office/2006/metadata/properties" ma:root="true" ma:fieldsID="f8923fe8aa0ace7ab58ef4ccc8b43a85" ns2:_="" ns3:_="">
     <xsd:import namespace="a709603d-609a-478b-a91d-3c5e984c0e79"/>
@@ -13855,7 +14376,7 @@
 </ct:contentTypeSchema>
 </file>
 
-<file path=customXml/item2.xml><?xml version="1.0" encoding="utf-8"?>
+<file path=customXml/item3.xml><?xml version="1.0" encoding="utf-8"?>
 <?mso-contentType ?>
 <customXsn xmlns="http://schemas.microsoft.com/office/2006/metadata/customXsn">
   <xsnLocation/>
@@ -13865,7 +14386,7 @@
 </customXsn>
 </file>
 
-<file path=customXml/item3.xml><?xml version="1.0" encoding="utf-8"?>
+<file path=customXml/item4.xml><?xml version="1.0" encoding="utf-8"?>
 <p:properties xmlns:p="http://schemas.microsoft.com/office/2006/metadata/properties" xmlns:xsi="http://www.w3.org/2001/XMLSchema-instance" xmlns:pc="http://schemas.microsoft.com/office/infopath/2007/PartnerControls">
   <documentManagement>
     <Ver xmlns="a709603d-609a-478b-a91d-3c5e984c0e79">6</Ver>
@@ -13873,16 +14394,15 @@
 </p:properties>
 </file>
 
-<file path=customXml/item4.xml><?xml version="1.0" encoding="utf-8"?>
-<?mso-contentType ?>
-<FormTemplates xmlns="http://schemas.microsoft.com/sharepoint/v3/contenttype/forms">
-  <Display>DocumentLibraryForm</Display>
-  <Edit>DocumentLibraryForm</Edit>
-  <New>DocumentLibraryForm</New>
-</FormTemplates>
+<file path=customXml/itemProps1.xml><?xml version="1.0" encoding="utf-8"?>
+<ds:datastoreItem xmlns:ds="http://schemas.openxmlformats.org/officeDocument/2006/customXml" ds:itemID="{0798C815-8BFC-40A4-9A7C-EEF0C751F65B}">
+  <ds:schemaRefs>
+    <ds:schemaRef ds:uri="http://schemas.microsoft.com/sharepoint/v3/contenttype/forms"/>
+  </ds:schemaRefs>
+</ds:datastoreItem>
 </file>
 
-<file path=customXml/itemProps1.xml><?xml version="1.0" encoding="utf-8"?>
+<file path=customXml/itemProps2.xml><?xml version="1.0" encoding="utf-8"?>
 <ds:datastoreItem xmlns:ds="http://schemas.openxmlformats.org/officeDocument/2006/customXml" ds:itemID="{0BD05732-A18E-4ACC-BAF0-4F5BA363712D}">
   <ds:schemaRefs>
     <ds:schemaRef ds:uri="http://schemas.microsoft.com/office/2006/metadata/contentType"/>
@@ -13901,7 +14421,7 @@
 </ds:datastoreItem>
 </file>
 
-<file path=customXml/itemProps2.xml><?xml version="1.0" encoding="utf-8"?>
+<file path=customXml/itemProps3.xml><?xml version="1.0" encoding="utf-8"?>
 <ds:datastoreItem xmlns:ds="http://schemas.openxmlformats.org/officeDocument/2006/customXml" ds:itemID="{81A1D47A-9DC1-47A1-A34A-208239125E1E}">
   <ds:schemaRefs>
     <ds:schemaRef ds:uri="http://schemas.microsoft.com/office/2006/metadata/customXsn"/>
@@ -13909,27 +14429,19 @@
 </ds:datastoreItem>
 </file>
 
-<file path=customXml/itemProps3.xml><?xml version="1.0" encoding="utf-8"?>
+<file path=customXml/itemProps4.xml><?xml version="1.0" encoding="utf-8"?>
 <ds:datastoreItem xmlns:ds="http://schemas.openxmlformats.org/officeDocument/2006/customXml" ds:itemID="{59A2C73D-5217-401F-9A34-91CEEFE385C1}">
   <ds:schemaRefs>
+    <ds:schemaRef ds:uri="http://schemas.microsoft.com/office/infopath/2007/PartnerControls"/>
+    <ds:schemaRef ds:uri="http://purl.org/dc/dcmitype/"/>
+    <ds:schemaRef ds:uri="6ef45842-284e-44e4-b2db-1749e7948b44"/>
     <ds:schemaRef ds:uri="http://schemas.microsoft.com/office/2006/documentManagement/types"/>
-    <ds:schemaRef ds:uri="http://purl.org/dc/dcmitype/"/>
+    <ds:schemaRef ds:uri="http://purl.org/dc/terms/"/>
+    <ds:schemaRef ds:uri="a709603d-609a-478b-a91d-3c5e984c0e79"/>
     <ds:schemaRef ds:uri="http://schemas.microsoft.com/office/2006/metadata/properties"/>
+    <ds:schemaRef ds:uri="http://schemas.openxmlformats.org/package/2006/metadata/core-properties"/>
+    <ds:schemaRef ds:uri="http://www.w3.org/XML/1998/namespace"/>
     <ds:schemaRef ds:uri="http://purl.org/dc/elements/1.1/"/>
-    <ds:schemaRef ds:uri="http://www.w3.org/XML/1998/namespace"/>
-    <ds:schemaRef ds:uri="a709603d-609a-478b-a91d-3c5e984c0e79"/>
-    <ds:schemaRef ds:uri="http://schemas.microsoft.com/office/infopath/2007/PartnerControls"/>
-    <ds:schemaRef ds:uri="http://schemas.openxmlformats.org/package/2006/metadata/core-properties"/>
-    <ds:schemaRef ds:uri="6ef45842-284e-44e4-b2db-1749e7948b44"/>
-    <ds:schemaRef ds:uri="http://purl.org/dc/terms/"/>
-  </ds:schemaRefs>
-</ds:datastoreItem>
-</file>
-
-<file path=customXml/itemProps4.xml><?xml version="1.0" encoding="utf-8"?>
-<ds:datastoreItem xmlns:ds="http://schemas.openxmlformats.org/officeDocument/2006/customXml" ds:itemID="{0798C815-8BFC-40A4-9A7C-EEF0C751F65B}">
-  <ds:schemaRefs>
-    <ds:schemaRef ds:uri="http://schemas.microsoft.com/sharepoint/v3/contenttype/forms"/>
   </ds:schemaRefs>
 </ds:datastoreItem>
 </file>
</xml_diff>